<commit_message>
OTC.Core: - Implemented the model Decoder -> Output -> Connection -> Element for accessories and feedback.
</commit_message>
<xml_diff>
--- a/docs/classes.pptx
+++ b/docs/classes.pptx
@@ -8,6 +8,7 @@
     <p:sldId id="256" r:id="rId2"/>
     <p:sldId id="257" r:id="rId3"/>
     <p:sldId id="258" r:id="rId4"/>
+    <p:sldId id="259" r:id="rId5"/>
   </p:sldIdLst>
   <p:sldSz cx="9144000" cy="6858000" type="screen4x3"/>
   <p:notesSz cx="6858000" cy="9144000"/>
@@ -291,7 +292,7 @@
             <a:fld id="{0F85C38B-D7AD-4BD4-AA0D-2F7E2B607052}" type="datetimeFigureOut">
               <a:rPr lang="es-ES" smtClean="0"/>
               <a:pPr/>
-              <a:t>16/11/2018</a:t>
+              <a:t>05/05/2020</a:t>
             </a:fld>
             <a:endParaRPr lang="es-ES"/>
           </a:p>
@@ -458,7 +459,7 @@
             <a:fld id="{0F85C38B-D7AD-4BD4-AA0D-2F7E2B607052}" type="datetimeFigureOut">
               <a:rPr lang="es-ES" smtClean="0"/>
               <a:pPr/>
-              <a:t>16/11/2018</a:t>
+              <a:t>05/05/2020</a:t>
             </a:fld>
             <a:endParaRPr lang="es-ES"/>
           </a:p>
@@ -635,7 +636,7 @@
             <a:fld id="{0F85C38B-D7AD-4BD4-AA0D-2F7E2B607052}" type="datetimeFigureOut">
               <a:rPr lang="es-ES" smtClean="0"/>
               <a:pPr/>
-              <a:t>16/11/2018</a:t>
+              <a:t>05/05/2020</a:t>
             </a:fld>
             <a:endParaRPr lang="es-ES"/>
           </a:p>
@@ -802,7 +803,7 @@
             <a:fld id="{0F85C38B-D7AD-4BD4-AA0D-2F7E2B607052}" type="datetimeFigureOut">
               <a:rPr lang="es-ES" smtClean="0"/>
               <a:pPr/>
-              <a:t>16/11/2018</a:t>
+              <a:t>05/05/2020</a:t>
             </a:fld>
             <a:endParaRPr lang="es-ES"/>
           </a:p>
@@ -1045,7 +1046,7 @@
             <a:fld id="{0F85C38B-D7AD-4BD4-AA0D-2F7E2B607052}" type="datetimeFigureOut">
               <a:rPr lang="es-ES" smtClean="0"/>
               <a:pPr/>
-              <a:t>16/11/2018</a:t>
+              <a:t>05/05/2020</a:t>
             </a:fld>
             <a:endParaRPr lang="es-ES"/>
           </a:p>
@@ -1330,7 +1331,7 @@
             <a:fld id="{0F85C38B-D7AD-4BD4-AA0D-2F7E2B607052}" type="datetimeFigureOut">
               <a:rPr lang="es-ES" smtClean="0"/>
               <a:pPr/>
-              <a:t>16/11/2018</a:t>
+              <a:t>05/05/2020</a:t>
             </a:fld>
             <a:endParaRPr lang="es-ES"/>
           </a:p>
@@ -1749,7 +1750,7 @@
             <a:fld id="{0F85C38B-D7AD-4BD4-AA0D-2F7E2B607052}" type="datetimeFigureOut">
               <a:rPr lang="es-ES" smtClean="0"/>
               <a:pPr/>
-              <a:t>16/11/2018</a:t>
+              <a:t>05/05/2020</a:t>
             </a:fld>
             <a:endParaRPr lang="es-ES"/>
           </a:p>
@@ -1864,7 +1865,7 @@
             <a:fld id="{0F85C38B-D7AD-4BD4-AA0D-2F7E2B607052}" type="datetimeFigureOut">
               <a:rPr lang="es-ES" smtClean="0"/>
               <a:pPr/>
-              <a:t>16/11/2018</a:t>
+              <a:t>05/05/2020</a:t>
             </a:fld>
             <a:endParaRPr lang="es-ES"/>
           </a:p>
@@ -1956,7 +1957,7 @@
             <a:fld id="{0F85C38B-D7AD-4BD4-AA0D-2F7E2B607052}" type="datetimeFigureOut">
               <a:rPr lang="es-ES" smtClean="0"/>
               <a:pPr/>
-              <a:t>16/11/2018</a:t>
+              <a:t>05/05/2020</a:t>
             </a:fld>
             <a:endParaRPr lang="es-ES"/>
           </a:p>
@@ -2230,7 +2231,7 @@
             <a:fld id="{0F85C38B-D7AD-4BD4-AA0D-2F7E2B607052}" type="datetimeFigureOut">
               <a:rPr lang="es-ES" smtClean="0"/>
               <a:pPr/>
-              <a:t>16/11/2018</a:t>
+              <a:t>05/05/2020</a:t>
             </a:fld>
             <a:endParaRPr lang="es-ES"/>
           </a:p>
@@ -2480,7 +2481,7 @@
             <a:fld id="{0F85C38B-D7AD-4BD4-AA0D-2F7E2B607052}" type="datetimeFigureOut">
               <a:rPr lang="es-ES" smtClean="0"/>
               <a:pPr/>
-              <a:t>16/11/2018</a:t>
+              <a:t>05/05/2020</a:t>
             </a:fld>
             <a:endParaRPr lang="es-ES"/>
           </a:p>
@@ -2690,7 +2691,7 @@
             <a:fld id="{0F85C38B-D7AD-4BD4-AA0D-2F7E2B607052}" type="datetimeFigureOut">
               <a:rPr lang="es-ES" smtClean="0"/>
               <a:pPr/>
-              <a:t>16/11/2018</a:t>
+              <a:t>05/05/2020</a:t>
             </a:fld>
             <a:endParaRPr lang="es-ES"/>
           </a:p>
@@ -3069,7 +3070,7 @@
         </p:nvSpPr>
         <p:spPr>
           <a:xfrm>
-            <a:off x="4860032" y="1412776"/>
+            <a:off x="3923928" y="332656"/>
             <a:ext cx="1224136" cy="504056"/>
           </a:xfrm>
           <a:prstGeom prst="rect">
@@ -3111,7 +3112,7 @@
         </p:nvSpPr>
         <p:spPr>
           <a:xfrm>
-            <a:off x="3563888" y="2852936"/>
+            <a:off x="2627784" y="1412776"/>
             <a:ext cx="1728192" cy="504056"/>
           </a:xfrm>
           <a:prstGeom prst="rect">
@@ -3138,10 +3139,10 @@
           <a:p>
             <a:pPr algn="ctr"/>
             <a:r>
-              <a:rPr lang="en-GB" sz="1600" smtClean="0"/>
+              <a:rPr lang="en-GB" sz="1400" smtClean="0"/>
               <a:t>Switchboards</a:t>
             </a:r>
-            <a:endParaRPr lang="en-GB" sz="1600"/>
+            <a:endParaRPr lang="en-GB" sz="1400"/>
           </a:p>
         </p:txBody>
       </p:sp>
@@ -3153,7 +3154,7 @@
         </p:nvSpPr>
         <p:spPr>
           <a:xfrm>
-            <a:off x="5724128" y="2852936"/>
+            <a:off x="4788024" y="1412776"/>
             <a:ext cx="1728192" cy="504056"/>
           </a:xfrm>
           <a:prstGeom prst="rect">
@@ -3180,10 +3181,10 @@
           <a:p>
             <a:pPr algn="ctr"/>
             <a:r>
-              <a:rPr lang="en-GB" sz="1600" dirty="0" smtClean="0"/>
-              <a:t>Control devices</a:t>
-            </a:r>
-            <a:endParaRPr lang="en-GB" sz="1600" dirty="0"/>
+              <a:rPr lang="en-GB" sz="1400" dirty="0" smtClean="0"/>
+              <a:t>Accessory decoders</a:t>
+            </a:r>
+            <a:endParaRPr lang="en-GB" sz="1400" dirty="0"/>
           </a:p>
         </p:txBody>
       </p:sp>
@@ -3198,8 +3199,8 @@
         </p:nvCxnSpPr>
         <p:spPr>
           <a:xfrm flipH="1">
-            <a:off x="4427984" y="1916832"/>
-            <a:ext cx="1044116" cy="936104"/>
+            <a:off x="3491880" y="836712"/>
+            <a:ext cx="1044116" cy="576064"/>
           </a:xfrm>
           <a:prstGeom prst="straightConnector1">
             <a:avLst/>
@@ -3234,8 +3235,8 @@
         </p:nvCxnSpPr>
         <p:spPr>
           <a:xfrm>
-            <a:off x="5472100" y="1916832"/>
-            <a:ext cx="1116124" cy="936104"/>
+            <a:off x="4535996" y="836712"/>
+            <a:ext cx="1116124" cy="576064"/>
           </a:xfrm>
           <a:prstGeom prst="straightConnector1">
             <a:avLst/>
@@ -3267,7 +3268,7 @@
         </p:nvSpPr>
         <p:spPr>
           <a:xfrm>
-            <a:off x="3563888" y="4005064"/>
+            <a:off x="2627784" y="4221088"/>
             <a:ext cx="1728192" cy="504056"/>
           </a:xfrm>
           <a:prstGeom prst="rect">
@@ -3294,10 +3295,10 @@
           <a:p>
             <a:pPr algn="ctr"/>
             <a:r>
-              <a:rPr lang="en-GB" sz="1600" dirty="0" smtClean="0"/>
+              <a:rPr lang="en-GB" sz="1400" dirty="0" smtClean="0"/>
               <a:t>Elements</a:t>
             </a:r>
-            <a:endParaRPr lang="en-GB" sz="1600" dirty="0"/>
+            <a:endParaRPr lang="en-GB" sz="1400" dirty="0"/>
           </a:p>
         </p:txBody>
       </p:sp>
@@ -3312,8 +3313,8 @@
         </p:nvCxnSpPr>
         <p:spPr>
           <a:xfrm>
-            <a:off x="4427984" y="3356992"/>
-            <a:ext cx="0" cy="648072"/>
+            <a:off x="3491880" y="1916832"/>
+            <a:ext cx="0" cy="2304256"/>
           </a:xfrm>
           <a:prstGeom prst="straightConnector1">
             <a:avLst/>
@@ -3345,7 +3346,7 @@
         </p:nvSpPr>
         <p:spPr>
           <a:xfrm>
-            <a:off x="3563888" y="5085184"/>
+            <a:off x="2627784" y="5301208"/>
             <a:ext cx="1728192" cy="504056"/>
           </a:xfrm>
           <a:prstGeom prst="rect">
@@ -3372,10 +3373,10 @@
           <a:p>
             <a:pPr algn="ctr"/>
             <a:r>
-              <a:rPr lang="en-GB" sz="1600" dirty="0" smtClean="0"/>
+              <a:rPr lang="en-GB" sz="1400" dirty="0" smtClean="0"/>
               <a:t>Actions</a:t>
             </a:r>
-            <a:endParaRPr lang="en-GB" sz="1600" dirty="0"/>
+            <a:endParaRPr lang="en-GB" sz="1400" dirty="0"/>
           </a:p>
         </p:txBody>
       </p:sp>
@@ -3390,7 +3391,7 @@
         </p:nvCxnSpPr>
         <p:spPr>
           <a:xfrm>
-            <a:off x="4427984" y="4509120"/>
+            <a:off x="3491880" y="4725144"/>
             <a:ext cx="0" cy="576064"/>
           </a:xfrm>
           <a:prstGeom prst="straightConnector1">
@@ -3424,7 +3425,7 @@
         </p:nvSpPr>
         <p:spPr>
           <a:xfrm>
-            <a:off x="1763688" y="5085184"/>
+            <a:off x="827584" y="5301208"/>
             <a:ext cx="1152128" cy="504056"/>
           </a:xfrm>
           <a:prstGeom prst="rect">
@@ -3451,10 +3452,10 @@
           <a:p>
             <a:pPr algn="ctr"/>
             <a:r>
-              <a:rPr lang="en-GB" sz="1600" dirty="0" smtClean="0"/>
+              <a:rPr lang="en-GB" sz="1400" dirty="0" smtClean="0"/>
               <a:t>Sounds</a:t>
             </a:r>
-            <a:endParaRPr lang="en-GB" sz="1600" dirty="0"/>
+            <a:endParaRPr lang="en-GB" sz="1400" dirty="0"/>
           </a:p>
         </p:txBody>
       </p:sp>
@@ -3469,7 +3470,7 @@
         </p:nvCxnSpPr>
         <p:spPr>
           <a:xfrm>
-            <a:off x="2915816" y="5337212"/>
+            <a:off x="1979712" y="5553236"/>
             <a:ext cx="648072" cy="0"/>
           </a:xfrm>
           <a:prstGeom prst="straightConnector1">
@@ -3502,7 +3503,7 @@
         </p:nvSpPr>
         <p:spPr>
           <a:xfrm>
-            <a:off x="5724128" y="4005064"/>
+            <a:off x="4788024" y="2420888"/>
             <a:ext cx="1728192" cy="504056"/>
           </a:xfrm>
           <a:prstGeom prst="rect">
@@ -3529,10 +3530,10 @@
           <a:p>
             <a:pPr algn="ctr"/>
             <a:r>
-              <a:rPr lang="en-GB" sz="1600" dirty="0" smtClean="0"/>
-              <a:t>Connections</a:t>
-            </a:r>
-            <a:endParaRPr lang="en-GB" sz="1600" dirty="0"/>
+              <a:rPr lang="en-GB" sz="1400" dirty="0" smtClean="0"/>
+              <a:t>Outputs</a:t>
+            </a:r>
+            <a:endParaRPr lang="en-GB" sz="1400" dirty="0"/>
           </a:p>
         </p:txBody>
       </p:sp>
@@ -3547,8 +3548,8 @@
         </p:nvCxnSpPr>
         <p:spPr>
           <a:xfrm>
-            <a:off x="6588224" y="3356992"/>
-            <a:ext cx="0" cy="648072"/>
+            <a:off x="5652120" y="1916832"/>
+            <a:ext cx="0" cy="504056"/>
           </a:xfrm>
           <a:prstGeom prst="straightConnector1">
             <a:avLst/>
@@ -3576,20 +3577,21 @@
         <p:nvCxnSpPr>
           <p:cNvPr id="32" name="31 Conector recto de flecha"/>
           <p:cNvCxnSpPr>
-            <a:stCxn id="28" idx="1"/>
+            <a:stCxn id="31" idx="2"/>
             <a:endCxn id="15" idx="3"/>
           </p:cNvCxnSpPr>
           <p:nvPr/>
         </p:nvCxnSpPr>
         <p:spPr>
           <a:xfrm flipH="1">
-            <a:off x="5292080" y="4257092"/>
-            <a:ext cx="432048" cy="0"/>
+            <a:off x="4355976" y="3933056"/>
+            <a:ext cx="1296144" cy="540060"/>
           </a:xfrm>
           <a:prstGeom prst="straightConnector1">
             <a:avLst/>
           </a:prstGeom>
           <a:ln>
+            <a:headEnd type="arrow"/>
             <a:tailEnd type="arrow"/>
           </a:ln>
         </p:spPr>
@@ -3610,35 +3612,545 @@
       </p:cxnSp>
       <p:sp>
         <p:nvSpPr>
-          <p:cNvPr id="33" name="32 CuadroTexto"/>
-          <p:cNvSpPr txBox="1"/>
-          <p:nvPr/>
-        </p:nvSpPr>
-        <p:spPr>
-          <a:xfrm>
-            <a:off x="467544" y="404664"/>
-            <a:ext cx="8280920" cy="584775"/>
+          <p:cNvPr id="19" name="18 Rectángulo"/>
+          <p:cNvSpPr/>
+          <p:nvPr/>
+        </p:nvSpPr>
+        <p:spPr>
+          <a:xfrm>
+            <a:off x="6948264" y="1412776"/>
+            <a:ext cx="1728192" cy="504056"/>
           </a:xfrm>
           <a:prstGeom prst="rect">
             <a:avLst/>
           </a:prstGeom>
-          <a:noFill/>
-        </p:spPr>
-        <p:txBody>
-          <a:bodyPr wrap="square" rtlCol="0">
-            <a:spAutoFit/>
-          </a:bodyPr>
+        </p:spPr>
+        <p:style>
+          <a:lnRef idx="1">
+            <a:schemeClr val="accent1"/>
+          </a:lnRef>
+          <a:fillRef idx="2">
+            <a:schemeClr val="accent1"/>
+          </a:fillRef>
+          <a:effectRef idx="1">
+            <a:schemeClr val="accent1"/>
+          </a:effectRef>
+          <a:fontRef idx="minor">
+            <a:schemeClr val="dk1"/>
+          </a:fontRef>
+        </p:style>
+        <p:txBody>
+          <a:bodyPr rtlCol="0" anchor="ctr"/>
           <a:lstStyle/>
           <a:p>
             <a:pPr algn="ctr"/>
             <a:r>
-              <a:rPr lang="es-ES" sz="3200" dirty="0" smtClean="0"/>
-              <a:t>OTC PROJECT CLASS DIAGRAM</a:t>
-            </a:r>
-            <a:endParaRPr lang="es-ES" sz="3200" dirty="0"/>
-          </a:p>
-        </p:txBody>
-      </p:sp>
+              <a:rPr lang="en-GB" sz="1400" dirty="0" smtClean="0"/>
+              <a:t>Feedback encoders</a:t>
+            </a:r>
+            <a:endParaRPr lang="en-GB" sz="1400" dirty="0"/>
+          </a:p>
+        </p:txBody>
+      </p:sp>
+      <p:cxnSp>
+        <p:nvCxnSpPr>
+          <p:cNvPr id="25" name="24 Conector recto de flecha"/>
+          <p:cNvCxnSpPr>
+            <a:stCxn id="4" idx="2"/>
+            <a:endCxn id="19" idx="0"/>
+          </p:cNvCxnSpPr>
+          <p:nvPr/>
+        </p:nvCxnSpPr>
+        <p:spPr>
+          <a:xfrm>
+            <a:off x="4535996" y="836712"/>
+            <a:ext cx="3276364" cy="576064"/>
+          </a:xfrm>
+          <a:prstGeom prst="straightConnector1">
+            <a:avLst/>
+          </a:prstGeom>
+          <a:ln>
+            <a:tailEnd type="arrow"/>
+          </a:ln>
+        </p:spPr>
+        <p:style>
+          <a:lnRef idx="1">
+            <a:schemeClr val="accent1"/>
+          </a:lnRef>
+          <a:fillRef idx="0">
+            <a:schemeClr val="accent1"/>
+          </a:fillRef>
+          <a:effectRef idx="0">
+            <a:schemeClr val="accent1"/>
+          </a:effectRef>
+          <a:fontRef idx="minor">
+            <a:schemeClr val="tx1"/>
+          </a:fontRef>
+        </p:style>
+      </p:cxnSp>
+      <p:sp>
+        <p:nvSpPr>
+          <p:cNvPr id="26" name="25 Rectángulo"/>
+          <p:cNvSpPr/>
+          <p:nvPr/>
+        </p:nvSpPr>
+        <p:spPr>
+          <a:xfrm>
+            <a:off x="6948264" y="2420888"/>
+            <a:ext cx="1728192" cy="504056"/>
+          </a:xfrm>
+          <a:prstGeom prst="rect">
+            <a:avLst/>
+          </a:prstGeom>
+        </p:spPr>
+        <p:style>
+          <a:lnRef idx="1">
+            <a:schemeClr val="accent1"/>
+          </a:lnRef>
+          <a:fillRef idx="2">
+            <a:schemeClr val="accent1"/>
+          </a:fillRef>
+          <a:effectRef idx="1">
+            <a:schemeClr val="accent1"/>
+          </a:effectRef>
+          <a:fontRef idx="minor">
+            <a:schemeClr val="dk1"/>
+          </a:fontRef>
+        </p:style>
+        <p:txBody>
+          <a:bodyPr rtlCol="0" anchor="ctr"/>
+          <a:lstStyle/>
+          <a:p>
+            <a:pPr algn="ctr"/>
+            <a:r>
+              <a:rPr lang="en-GB" sz="1400" dirty="0" smtClean="0"/>
+              <a:t>Inputs</a:t>
+            </a:r>
+            <a:endParaRPr lang="en-GB" sz="1400" dirty="0"/>
+          </a:p>
+        </p:txBody>
+      </p:sp>
+      <p:sp>
+        <p:nvSpPr>
+          <p:cNvPr id="29" name="28 Rectángulo"/>
+          <p:cNvSpPr/>
+          <p:nvPr/>
+        </p:nvSpPr>
+        <p:spPr>
+          <a:xfrm>
+            <a:off x="6948264" y="3429000"/>
+            <a:ext cx="1728192" cy="504056"/>
+          </a:xfrm>
+          <a:prstGeom prst="rect">
+            <a:avLst/>
+          </a:prstGeom>
+        </p:spPr>
+        <p:style>
+          <a:lnRef idx="1">
+            <a:schemeClr val="accent1"/>
+          </a:lnRef>
+          <a:fillRef idx="2">
+            <a:schemeClr val="accent1"/>
+          </a:fillRef>
+          <a:effectRef idx="1">
+            <a:schemeClr val="accent1"/>
+          </a:effectRef>
+          <a:fontRef idx="minor">
+            <a:schemeClr val="dk1"/>
+          </a:fontRef>
+        </p:style>
+        <p:txBody>
+          <a:bodyPr rtlCol="0" anchor="ctr"/>
+          <a:lstStyle/>
+          <a:p>
+            <a:pPr algn="ctr"/>
+            <a:r>
+              <a:rPr lang="en-GB" sz="1400" dirty="0" smtClean="0"/>
+              <a:t>Connections</a:t>
+            </a:r>
+            <a:endParaRPr lang="en-GB" sz="1400" dirty="0"/>
+          </a:p>
+        </p:txBody>
+      </p:sp>
+      <p:sp>
+        <p:nvSpPr>
+          <p:cNvPr id="31" name="30 Rectángulo"/>
+          <p:cNvSpPr/>
+          <p:nvPr/>
+        </p:nvSpPr>
+        <p:spPr>
+          <a:xfrm>
+            <a:off x="4788024" y="3429000"/>
+            <a:ext cx="1728192" cy="504056"/>
+          </a:xfrm>
+          <a:prstGeom prst="rect">
+            <a:avLst/>
+          </a:prstGeom>
+        </p:spPr>
+        <p:style>
+          <a:lnRef idx="1">
+            <a:schemeClr val="accent1"/>
+          </a:lnRef>
+          <a:fillRef idx="2">
+            <a:schemeClr val="accent1"/>
+          </a:fillRef>
+          <a:effectRef idx="1">
+            <a:schemeClr val="accent1"/>
+          </a:effectRef>
+          <a:fontRef idx="minor">
+            <a:schemeClr val="dk1"/>
+          </a:fontRef>
+        </p:style>
+        <p:txBody>
+          <a:bodyPr rtlCol="0" anchor="ctr"/>
+          <a:lstStyle/>
+          <a:p>
+            <a:pPr algn="ctr"/>
+            <a:r>
+              <a:rPr lang="en-GB" sz="1400" dirty="0" smtClean="0"/>
+              <a:t>Connections</a:t>
+            </a:r>
+            <a:endParaRPr lang="en-GB" sz="1400" dirty="0"/>
+          </a:p>
+        </p:txBody>
+      </p:sp>
+      <p:cxnSp>
+        <p:nvCxnSpPr>
+          <p:cNvPr id="36" name="35 Conector recto de flecha"/>
+          <p:cNvCxnSpPr>
+            <a:stCxn id="19" idx="2"/>
+            <a:endCxn id="26" idx="0"/>
+          </p:cNvCxnSpPr>
+          <p:nvPr/>
+        </p:nvCxnSpPr>
+        <p:spPr>
+          <a:xfrm>
+            <a:off x="7812360" y="1916832"/>
+            <a:ext cx="0" cy="504056"/>
+          </a:xfrm>
+          <a:prstGeom prst="straightConnector1">
+            <a:avLst/>
+          </a:prstGeom>
+          <a:ln>
+            <a:tailEnd type="arrow"/>
+          </a:ln>
+        </p:spPr>
+        <p:style>
+          <a:lnRef idx="1">
+            <a:schemeClr val="accent1"/>
+          </a:lnRef>
+          <a:fillRef idx="0">
+            <a:schemeClr val="accent1"/>
+          </a:fillRef>
+          <a:effectRef idx="0">
+            <a:schemeClr val="accent1"/>
+          </a:effectRef>
+          <a:fontRef idx="minor">
+            <a:schemeClr val="tx1"/>
+          </a:fontRef>
+        </p:style>
+      </p:cxnSp>
+      <p:cxnSp>
+        <p:nvCxnSpPr>
+          <p:cNvPr id="38" name="37 Conector recto de flecha"/>
+          <p:cNvCxnSpPr>
+            <a:stCxn id="26" idx="2"/>
+            <a:endCxn id="29" idx="0"/>
+          </p:cNvCxnSpPr>
+          <p:nvPr/>
+        </p:nvCxnSpPr>
+        <p:spPr>
+          <a:xfrm>
+            <a:off x="7812360" y="2924944"/>
+            <a:ext cx="0" cy="504056"/>
+          </a:xfrm>
+          <a:prstGeom prst="straightConnector1">
+            <a:avLst/>
+          </a:prstGeom>
+          <a:ln>
+            <a:tailEnd type="arrow"/>
+          </a:ln>
+        </p:spPr>
+        <p:style>
+          <a:lnRef idx="1">
+            <a:schemeClr val="accent1"/>
+          </a:lnRef>
+          <a:fillRef idx="0">
+            <a:schemeClr val="accent1"/>
+          </a:fillRef>
+          <a:effectRef idx="0">
+            <a:schemeClr val="accent1"/>
+          </a:effectRef>
+          <a:fontRef idx="minor">
+            <a:schemeClr val="tx1"/>
+          </a:fontRef>
+        </p:style>
+      </p:cxnSp>
+      <p:cxnSp>
+        <p:nvCxnSpPr>
+          <p:cNvPr id="40" name="39 Conector recto de flecha"/>
+          <p:cNvCxnSpPr>
+            <a:stCxn id="28" idx="2"/>
+            <a:endCxn id="31" idx="0"/>
+          </p:cNvCxnSpPr>
+          <p:nvPr/>
+        </p:nvCxnSpPr>
+        <p:spPr>
+          <a:xfrm>
+            <a:off x="5652120" y="2924944"/>
+            <a:ext cx="0" cy="504056"/>
+          </a:xfrm>
+          <a:prstGeom prst="straightConnector1">
+            <a:avLst/>
+          </a:prstGeom>
+          <a:ln>
+            <a:tailEnd type="arrow"/>
+          </a:ln>
+        </p:spPr>
+        <p:style>
+          <a:lnRef idx="1">
+            <a:schemeClr val="accent1"/>
+          </a:lnRef>
+          <a:fillRef idx="0">
+            <a:schemeClr val="accent1"/>
+          </a:fillRef>
+          <a:effectRef idx="0">
+            <a:schemeClr val="accent1"/>
+          </a:effectRef>
+          <a:fontRef idx="minor">
+            <a:schemeClr val="tx1"/>
+          </a:fontRef>
+        </p:style>
+      </p:cxnSp>
+      <p:cxnSp>
+        <p:nvCxnSpPr>
+          <p:cNvPr id="43" name="42 Conector recto de flecha"/>
+          <p:cNvCxnSpPr>
+            <a:stCxn id="29" idx="2"/>
+            <a:endCxn id="15" idx="3"/>
+          </p:cNvCxnSpPr>
+          <p:nvPr/>
+        </p:nvCxnSpPr>
+        <p:spPr>
+          <a:xfrm flipH="1">
+            <a:off x="4355976" y="3933056"/>
+            <a:ext cx="3456384" cy="540060"/>
+          </a:xfrm>
+          <a:prstGeom prst="straightConnector1">
+            <a:avLst/>
+          </a:prstGeom>
+          <a:ln>
+            <a:headEnd type="arrow"/>
+            <a:tailEnd type="arrow"/>
+          </a:ln>
+        </p:spPr>
+        <p:style>
+          <a:lnRef idx="1">
+            <a:schemeClr val="accent1"/>
+          </a:lnRef>
+          <a:fillRef idx="0">
+            <a:schemeClr val="accent1"/>
+          </a:fillRef>
+          <a:effectRef idx="0">
+            <a:schemeClr val="accent1"/>
+          </a:effectRef>
+          <a:fontRef idx="minor">
+            <a:schemeClr val="tx1"/>
+          </a:fontRef>
+        </p:style>
+      </p:cxnSp>
+      <p:sp>
+        <p:nvSpPr>
+          <p:cNvPr id="44" name="43 Rectángulo"/>
+          <p:cNvSpPr/>
+          <p:nvPr/>
+        </p:nvSpPr>
+        <p:spPr>
+          <a:xfrm>
+            <a:off x="467544" y="1412776"/>
+            <a:ext cx="1728192" cy="504056"/>
+          </a:xfrm>
+          <a:prstGeom prst="rect">
+            <a:avLst/>
+          </a:prstGeom>
+        </p:spPr>
+        <p:style>
+          <a:lnRef idx="1">
+            <a:schemeClr val="accent1"/>
+          </a:lnRef>
+          <a:fillRef idx="2">
+            <a:schemeClr val="accent1"/>
+          </a:fillRef>
+          <a:effectRef idx="1">
+            <a:schemeClr val="accent1"/>
+          </a:effectRef>
+          <a:fontRef idx="minor">
+            <a:schemeClr val="dk1"/>
+          </a:fontRef>
+        </p:style>
+        <p:txBody>
+          <a:bodyPr rtlCol="0" anchor="ctr"/>
+          <a:lstStyle/>
+          <a:p>
+            <a:pPr algn="ctr"/>
+            <a:r>
+              <a:rPr lang="en-GB" sz="1400" dirty="0" smtClean="0"/>
+              <a:t>Routes</a:t>
+            </a:r>
+            <a:endParaRPr lang="en-GB" sz="1400" dirty="0"/>
+          </a:p>
+        </p:txBody>
+      </p:sp>
+      <p:cxnSp>
+        <p:nvCxnSpPr>
+          <p:cNvPr id="46" name="45 Conector recto de flecha"/>
+          <p:cNvCxnSpPr>
+            <a:stCxn id="4" idx="2"/>
+            <a:endCxn id="44" idx="0"/>
+          </p:cNvCxnSpPr>
+          <p:nvPr/>
+        </p:nvCxnSpPr>
+        <p:spPr>
+          <a:xfrm flipH="1">
+            <a:off x="1331640" y="836712"/>
+            <a:ext cx="3204356" cy="576064"/>
+          </a:xfrm>
+          <a:prstGeom prst="straightConnector1">
+            <a:avLst/>
+          </a:prstGeom>
+          <a:ln>
+            <a:tailEnd type="arrow"/>
+          </a:ln>
+        </p:spPr>
+        <p:style>
+          <a:lnRef idx="1">
+            <a:schemeClr val="accent1"/>
+          </a:lnRef>
+          <a:fillRef idx="0">
+            <a:schemeClr val="accent1"/>
+          </a:fillRef>
+          <a:effectRef idx="0">
+            <a:schemeClr val="accent1"/>
+          </a:effectRef>
+          <a:fontRef idx="minor">
+            <a:schemeClr val="tx1"/>
+          </a:fontRef>
+        </p:style>
+      </p:cxnSp>
+      <p:sp>
+        <p:nvSpPr>
+          <p:cNvPr id="47" name="46 Rectángulo"/>
+          <p:cNvSpPr/>
+          <p:nvPr/>
+        </p:nvSpPr>
+        <p:spPr>
+          <a:xfrm>
+            <a:off x="467544" y="2420888"/>
+            <a:ext cx="1728192" cy="504056"/>
+          </a:xfrm>
+          <a:prstGeom prst="rect">
+            <a:avLst/>
+          </a:prstGeom>
+        </p:spPr>
+        <p:style>
+          <a:lnRef idx="1">
+            <a:schemeClr val="accent1"/>
+          </a:lnRef>
+          <a:fillRef idx="2">
+            <a:schemeClr val="accent1"/>
+          </a:fillRef>
+          <a:effectRef idx="1">
+            <a:schemeClr val="accent1"/>
+          </a:effectRef>
+          <a:fontRef idx="minor">
+            <a:schemeClr val="dk1"/>
+          </a:fontRef>
+        </p:style>
+        <p:txBody>
+          <a:bodyPr rtlCol="0" anchor="ctr"/>
+          <a:lstStyle/>
+          <a:p>
+            <a:pPr algn="ctr"/>
+            <a:r>
+              <a:rPr lang="en-GB" sz="1400" dirty="0" smtClean="0"/>
+              <a:t>Route elements</a:t>
+            </a:r>
+            <a:endParaRPr lang="en-GB" sz="1400" dirty="0"/>
+          </a:p>
+        </p:txBody>
+      </p:sp>
+      <p:cxnSp>
+        <p:nvCxnSpPr>
+          <p:cNvPr id="49" name="48 Conector recto de flecha"/>
+          <p:cNvCxnSpPr>
+            <a:stCxn id="44" idx="2"/>
+            <a:endCxn id="47" idx="0"/>
+          </p:cNvCxnSpPr>
+          <p:nvPr/>
+        </p:nvCxnSpPr>
+        <p:spPr>
+          <a:xfrm>
+            <a:off x="1331640" y="1916832"/>
+            <a:ext cx="0" cy="504056"/>
+          </a:xfrm>
+          <a:prstGeom prst="straightConnector1">
+            <a:avLst/>
+          </a:prstGeom>
+          <a:ln>
+            <a:tailEnd type="arrow"/>
+          </a:ln>
+        </p:spPr>
+        <p:style>
+          <a:lnRef idx="1">
+            <a:schemeClr val="accent1"/>
+          </a:lnRef>
+          <a:fillRef idx="0">
+            <a:schemeClr val="accent1"/>
+          </a:fillRef>
+          <a:effectRef idx="0">
+            <a:schemeClr val="accent1"/>
+          </a:effectRef>
+          <a:fontRef idx="minor">
+            <a:schemeClr val="tx1"/>
+          </a:fontRef>
+        </p:style>
+      </p:cxnSp>
+      <p:cxnSp>
+        <p:nvCxnSpPr>
+          <p:cNvPr id="51" name="50 Conector recto de flecha"/>
+          <p:cNvCxnSpPr>
+            <a:stCxn id="47" idx="2"/>
+            <a:endCxn id="15" idx="0"/>
+          </p:cNvCxnSpPr>
+          <p:nvPr/>
+        </p:nvCxnSpPr>
+        <p:spPr>
+          <a:xfrm>
+            <a:off x="1331640" y="2924944"/>
+            <a:ext cx="2160240" cy="1296144"/>
+          </a:xfrm>
+          <a:prstGeom prst="straightConnector1">
+            <a:avLst/>
+          </a:prstGeom>
+          <a:ln>
+            <a:tailEnd type="arrow"/>
+          </a:ln>
+        </p:spPr>
+        <p:style>
+          <a:lnRef idx="1">
+            <a:schemeClr val="accent1"/>
+          </a:lnRef>
+          <a:fillRef idx="0">
+            <a:schemeClr val="accent1"/>
+          </a:fillRef>
+          <a:effectRef idx="0">
+            <a:schemeClr val="accent1"/>
+          </a:effectRef>
+          <a:fontRef idx="minor">
+            <a:schemeClr val="tx1"/>
+          </a:fontRef>
+        </p:style>
+      </p:cxnSp>
     </p:spTree>
   </p:cSld>
   <p:clrMapOvr>
@@ -4567,15 +5079,7 @@
             <a:pPr algn="ctr"/>
             <a:r>
               <a:rPr lang="es-ES" sz="3200" dirty="0" smtClean="0"/>
-              <a:t>OTC </a:t>
-            </a:r>
-            <a:r>
-              <a:rPr lang="es-ES" sz="3200" dirty="0" smtClean="0"/>
-              <a:t>ACCESSORY CHANGE </a:t>
-            </a:r>
-            <a:r>
-              <a:rPr lang="es-ES" sz="3200" dirty="0" smtClean="0"/>
-              <a:t>FLOW</a:t>
+              <a:t>OTC ACCESSORY CHANGE FLOW</a:t>
             </a:r>
             <a:endParaRPr lang="es-ES" sz="3200" dirty="0"/>
           </a:p>
@@ -5055,13 +5559,7 @@
               <a:rPr lang="en-GB" sz="1050" noProof="1" smtClean="0">
                 <a:latin typeface="Consolas" pitchFamily="49" charset="0"/>
               </a:rPr>
-              <a:t>Project</a:t>
-            </a:r>
-            <a:r>
-              <a:rPr lang="en-GB" sz="1050" noProof="1" smtClean="0">
-                <a:latin typeface="Consolas" pitchFamily="49" charset="0"/>
-              </a:rPr>
-              <a:t>.AccessoryStatusChanged</a:t>
+              <a:t>Project.AccessoryStatusChanged</a:t>
             </a:r>
             <a:endParaRPr lang="en-GB" sz="1050" noProof="1">
               <a:latin typeface="Consolas" pitchFamily="49" charset="0"/>
@@ -5333,11 +5831,7 @@
           <a:p>
             <a:r>
               <a:rPr lang="en-GB" dirty="0" smtClean="0"/>
-              <a:t>EXTERNAL ACCESSORY </a:t>
-            </a:r>
-            <a:r>
-              <a:rPr lang="en-GB" dirty="0" smtClean="0"/>
-              <a:t>ACTIVATION</a:t>
+              <a:t>EXTERNAL ACCESSORY ACTIVATION</a:t>
             </a:r>
             <a:endParaRPr lang="en-GB" dirty="0"/>
           </a:p>
@@ -5367,11 +5861,7 @@
           <a:p>
             <a:r>
               <a:rPr lang="en-GB" dirty="0" smtClean="0"/>
-              <a:t>OTC ACCESSORY </a:t>
-            </a:r>
-            <a:r>
-              <a:rPr lang="en-GB" dirty="0" smtClean="0"/>
-              <a:t>ACTIVATION</a:t>
+              <a:t>OTC ACCESSORY ACTIVATION</a:t>
             </a:r>
             <a:endParaRPr lang="en-GB" dirty="0"/>
           </a:p>
@@ -5453,13 +5943,7 @@
               <a:rPr lang="en-GB" sz="1050" noProof="1" smtClean="0">
                 <a:latin typeface="Consolas" pitchFamily="49" charset="0"/>
               </a:rPr>
-              <a:t>IAccessory.SetAccessoryStatus</a:t>
-            </a:r>
-            <a:r>
-              <a:rPr lang="en-GB" sz="1050" noProof="1" smtClean="0">
-                <a:latin typeface="Consolas" pitchFamily="49" charset="0"/>
-              </a:rPr>
-              <a:t>()</a:t>
+              <a:t>IAccessory.SetAccessoryStatus()</a:t>
             </a:r>
             <a:endParaRPr lang="en-GB" sz="1050" noProof="1">
               <a:latin typeface="Consolas" pitchFamily="49" charset="0"/>
@@ -5508,6 +5992,341 @@
               <a:t>Switchboard</a:t>
             </a:r>
             <a:endParaRPr lang="en-GB" dirty="0"/>
+          </a:p>
+        </p:txBody>
+      </p:sp>
+    </p:spTree>
+  </p:cSld>
+  <p:clrMapOvr>
+    <a:masterClrMapping/>
+  </p:clrMapOvr>
+</p:sld>
+</file>
+
+<file path=ppt/slides/slide4.xml><?xml version="1.0" encoding="utf-8"?>
+<p:sld xmlns:a="http://schemas.openxmlformats.org/drawingml/2006/main" xmlns:r="http://schemas.openxmlformats.org/officeDocument/2006/relationships" xmlns:p="http://schemas.openxmlformats.org/presentationml/2006/main">
+  <p:cSld>
+    <p:spTree>
+      <p:nvGrpSpPr>
+        <p:cNvPr id="1" name=""/>
+        <p:cNvGrpSpPr/>
+        <p:nvPr/>
+      </p:nvGrpSpPr>
+      <p:grpSpPr>
+        <a:xfrm>
+          <a:off x="0" y="0"/>
+          <a:ext cx="0" cy="0"/>
+          <a:chOff x="0" y="0"/>
+          <a:chExt cx="0" cy="0"/>
+        </a:xfrm>
+      </p:grpSpPr>
+      <p:pic>
+        <p:nvPicPr>
+          <p:cNvPr id="1028" name="Picture 4" descr="Desvío esbelto a la derecha."/>
+          <p:cNvPicPr>
+            <a:picLocks noChangeAspect="1" noChangeArrowheads="1"/>
+          </p:cNvPicPr>
+          <p:nvPr/>
+        </p:nvPicPr>
+        <p:blipFill>
+          <a:blip r:embed="rId2" cstate="print">
+            <a:grayscl/>
+          </a:blip>
+          <a:srcRect l="9450" t="34484" r="9281" b="35011"/>
+          <a:stretch>
+            <a:fillRect/>
+          </a:stretch>
+        </p:blipFill>
+        <p:spPr bwMode="auto">
+          <a:xfrm rot="10800000">
+            <a:off x="755576" y="620689"/>
+            <a:ext cx="3269639" cy="874438"/>
+          </a:xfrm>
+          <a:prstGeom prst="rect">
+            <a:avLst/>
+          </a:prstGeom>
+          <a:noFill/>
+        </p:spPr>
+      </p:pic>
+      <p:pic>
+        <p:nvPicPr>
+          <p:cNvPr id="4" name="3 Imagen" descr="decoder.png"/>
+          <p:cNvPicPr>
+            <a:picLocks noChangeAspect="1"/>
+          </p:cNvPicPr>
+          <p:nvPr/>
+        </p:nvPicPr>
+        <p:blipFill>
+          <a:blip r:embed="rId3" cstate="print"/>
+          <a:stretch>
+            <a:fillRect/>
+          </a:stretch>
+        </p:blipFill>
+        <p:spPr>
+          <a:xfrm>
+            <a:off x="1072887" y="2132856"/>
+            <a:ext cx="3630215" cy="1944216"/>
+          </a:xfrm>
+          <a:prstGeom prst="rect">
+            <a:avLst/>
+          </a:prstGeom>
+        </p:spPr>
+      </p:pic>
+      <p:sp>
+        <p:nvSpPr>
+          <p:cNvPr id="5" name="4 Flecha arriba"/>
+          <p:cNvSpPr/>
+          <p:nvPr/>
+        </p:nvSpPr>
+        <p:spPr>
+          <a:xfrm>
+            <a:off x="1469344" y="1340768"/>
+            <a:ext cx="360040" cy="792088"/>
+          </a:xfrm>
+          <a:prstGeom prst="upArrow">
+            <a:avLst/>
+          </a:prstGeom>
+        </p:spPr>
+        <p:style>
+          <a:lnRef idx="2">
+            <a:schemeClr val="accent1">
+              <a:shade val="50000"/>
+            </a:schemeClr>
+          </a:lnRef>
+          <a:fillRef idx="1">
+            <a:schemeClr val="accent1"/>
+          </a:fillRef>
+          <a:effectRef idx="0">
+            <a:schemeClr val="accent1"/>
+          </a:effectRef>
+          <a:fontRef idx="minor">
+            <a:schemeClr val="lt1"/>
+          </a:fontRef>
+        </p:style>
+        <p:txBody>
+          <a:bodyPr rtlCol="0" anchor="ctr"/>
+          <a:lstStyle/>
+          <a:p>
+            <a:pPr algn="ctr"/>
+            <a:endParaRPr lang="en-GB"/>
+          </a:p>
+        </p:txBody>
+      </p:sp>
+      <p:pic>
+        <p:nvPicPr>
+          <p:cNvPr id="1030" name="Picture 6" descr="Travesía de unión doble"/>
+          <p:cNvPicPr>
+            <a:picLocks noChangeAspect="1" noChangeArrowheads="1"/>
+          </p:cNvPicPr>
+          <p:nvPr/>
+        </p:nvPicPr>
+        <p:blipFill>
+          <a:blip r:embed="rId4" cstate="print">
+            <a:grayscl/>
+          </a:blip>
+          <a:srcRect l="11340" t="25200" r="12116" b="28380"/>
+          <a:stretch>
+            <a:fillRect/>
+          </a:stretch>
+        </p:blipFill>
+        <p:spPr bwMode="auto">
+          <a:xfrm rot="10800000">
+            <a:off x="5470004" y="270173"/>
+            <a:ext cx="2736304" cy="1182353"/>
+          </a:xfrm>
+          <a:prstGeom prst="rect">
+            <a:avLst/>
+          </a:prstGeom>
+          <a:noFill/>
+        </p:spPr>
+      </p:pic>
+      <p:pic>
+        <p:nvPicPr>
+          <p:cNvPr id="9" name="8 Imagen" descr="decoder.png"/>
+          <p:cNvPicPr>
+            <a:picLocks noChangeAspect="1"/>
+          </p:cNvPicPr>
+          <p:nvPr/>
+        </p:nvPicPr>
+        <p:blipFill>
+          <a:blip r:embed="rId3" cstate="print"/>
+          <a:stretch>
+            <a:fillRect/>
+          </a:stretch>
+        </p:blipFill>
+        <p:spPr>
+          <a:xfrm>
+            <a:off x="5046241" y="2132856"/>
+            <a:ext cx="3630215" cy="1944216"/>
+          </a:xfrm>
+          <a:prstGeom prst="rect">
+            <a:avLst/>
+          </a:prstGeom>
+        </p:spPr>
+      </p:pic>
+      <p:sp>
+        <p:nvSpPr>
+          <p:cNvPr id="10" name="9 Flecha arriba"/>
+          <p:cNvSpPr/>
+          <p:nvPr/>
+        </p:nvSpPr>
+        <p:spPr>
+          <a:xfrm>
+            <a:off x="6427117" y="1476238"/>
+            <a:ext cx="360040" cy="648072"/>
+          </a:xfrm>
+          <a:prstGeom prst="upArrow">
+            <a:avLst/>
+          </a:prstGeom>
+        </p:spPr>
+        <p:style>
+          <a:lnRef idx="2">
+            <a:schemeClr val="accent1">
+              <a:shade val="50000"/>
+            </a:schemeClr>
+          </a:lnRef>
+          <a:fillRef idx="1">
+            <a:schemeClr val="accent1"/>
+          </a:fillRef>
+          <a:effectRef idx="0">
+            <a:schemeClr val="accent1"/>
+          </a:effectRef>
+          <a:fontRef idx="minor">
+            <a:schemeClr val="lt1"/>
+          </a:fontRef>
+        </p:style>
+        <p:txBody>
+          <a:bodyPr rtlCol="0" anchor="ctr"/>
+          <a:lstStyle/>
+          <a:p>
+            <a:pPr algn="ctr"/>
+            <a:endParaRPr lang="en-GB"/>
+          </a:p>
+        </p:txBody>
+      </p:sp>
+      <p:sp>
+        <p:nvSpPr>
+          <p:cNvPr id="11" name="10 Flecha arriba"/>
+          <p:cNvSpPr/>
+          <p:nvPr/>
+        </p:nvSpPr>
+        <p:spPr>
+          <a:xfrm>
+            <a:off x="6902623" y="1471565"/>
+            <a:ext cx="360040" cy="648072"/>
+          </a:xfrm>
+          <a:prstGeom prst="upArrow">
+            <a:avLst/>
+          </a:prstGeom>
+        </p:spPr>
+        <p:style>
+          <a:lnRef idx="2">
+            <a:schemeClr val="accent1">
+              <a:shade val="50000"/>
+            </a:schemeClr>
+          </a:lnRef>
+          <a:fillRef idx="1">
+            <a:schemeClr val="accent1"/>
+          </a:fillRef>
+          <a:effectRef idx="0">
+            <a:schemeClr val="accent1"/>
+          </a:effectRef>
+          <a:fontRef idx="minor">
+            <a:schemeClr val="lt1"/>
+          </a:fontRef>
+        </p:style>
+        <p:txBody>
+          <a:bodyPr rtlCol="0" anchor="ctr"/>
+          <a:lstStyle/>
+          <a:p>
+            <a:pPr algn="ctr"/>
+            <a:endParaRPr lang="en-GB"/>
+          </a:p>
+        </p:txBody>
+      </p:sp>
+      <p:pic>
+        <p:nvPicPr>
+          <p:cNvPr id="1032" name="Picture 8" descr="Color Light Distant Signal"/>
+          <p:cNvPicPr>
+            <a:picLocks noChangeAspect="1" noChangeArrowheads="1"/>
+          </p:cNvPicPr>
+          <p:nvPr/>
+        </p:nvPicPr>
+        <p:blipFill>
+          <a:blip r:embed="rId5" cstate="print"/>
+          <a:srcRect l="61552" t="13540" r="29414" b="24824"/>
+          <a:stretch>
+            <a:fillRect/>
+          </a:stretch>
+        </p:blipFill>
+        <p:spPr bwMode="auto">
+          <a:xfrm>
+            <a:off x="971600" y="4365104"/>
+            <a:ext cx="406780" cy="1977777"/>
+          </a:xfrm>
+          <a:prstGeom prst="rect">
+            <a:avLst/>
+          </a:prstGeom>
+          <a:noFill/>
+        </p:spPr>
+      </p:pic>
+      <p:sp>
+        <p:nvSpPr>
+          <p:cNvPr id="13" name="12 CuadroTexto"/>
+          <p:cNvSpPr txBox="1"/>
+          <p:nvPr/>
+        </p:nvSpPr>
+        <p:spPr>
+          <a:xfrm>
+            <a:off x="2201416" y="3152001"/>
+            <a:ext cx="1386855" cy="276999"/>
+          </a:xfrm>
+          <a:prstGeom prst="rect">
+            <a:avLst/>
+          </a:prstGeom>
+          <a:noFill/>
+        </p:spPr>
+        <p:txBody>
+          <a:bodyPr wrap="none" rtlCol="0">
+            <a:spAutoFit/>
+          </a:bodyPr>
+          <a:lstStyle/>
+          <a:p>
+            <a:r>
+              <a:rPr lang="en-GB" sz="1200" b="1" dirty="0" smtClean="0"/>
+              <a:t>Accessory Decoder</a:t>
+            </a:r>
+            <a:endParaRPr lang="en-GB" sz="1200" b="1" dirty="0"/>
+          </a:p>
+        </p:txBody>
+      </p:sp>
+      <p:sp>
+        <p:nvSpPr>
+          <p:cNvPr id="14" name="13 CuadroTexto"/>
+          <p:cNvSpPr txBox="1"/>
+          <p:nvPr/>
+        </p:nvSpPr>
+        <p:spPr>
+          <a:xfrm>
+            <a:off x="6171381" y="3160018"/>
+            <a:ext cx="1386855" cy="276999"/>
+          </a:xfrm>
+          <a:prstGeom prst="rect">
+            <a:avLst/>
+          </a:prstGeom>
+          <a:noFill/>
+        </p:spPr>
+        <p:txBody>
+          <a:bodyPr wrap="none" rtlCol="0">
+            <a:spAutoFit/>
+          </a:bodyPr>
+          <a:lstStyle/>
+          <a:p>
+            <a:r>
+              <a:rPr lang="en-GB" sz="1200" b="1" dirty="0" smtClean="0"/>
+              <a:t>Accessory Decoder</a:t>
+            </a:r>
+            <a:endParaRPr lang="en-GB" sz="1200" b="1" dirty="0"/>
           </a:p>
         </p:txBody>
       </p:sp>

</xml_diff>

<commit_message>
OTC.Core: - Implemented the first approach to traffic management RS:Control: - Implemented all new entities for traffic management.
</commit_message>
<xml_diff>
--- a/docs/classes.pptx
+++ b/docs/classes.pptx
@@ -9,6 +9,7 @@
     <p:sldId id="257" r:id="rId3"/>
     <p:sldId id="258" r:id="rId4"/>
     <p:sldId id="259" r:id="rId5"/>
+    <p:sldId id="260" r:id="rId6"/>
   </p:sldIdLst>
   <p:sldSz cx="9144000" cy="6858000" type="screen4x3"/>
   <p:notesSz cx="6858000" cy="9144000"/>
@@ -292,7 +293,7 @@
             <a:fld id="{0F85C38B-D7AD-4BD4-AA0D-2F7E2B607052}" type="datetimeFigureOut">
               <a:rPr lang="es-ES" smtClean="0"/>
               <a:pPr/>
-              <a:t>05/05/2020</a:t>
+              <a:t>14/05/2020</a:t>
             </a:fld>
             <a:endParaRPr lang="es-ES"/>
           </a:p>
@@ -459,7 +460,7 @@
             <a:fld id="{0F85C38B-D7AD-4BD4-AA0D-2F7E2B607052}" type="datetimeFigureOut">
               <a:rPr lang="es-ES" smtClean="0"/>
               <a:pPr/>
-              <a:t>05/05/2020</a:t>
+              <a:t>14/05/2020</a:t>
             </a:fld>
             <a:endParaRPr lang="es-ES"/>
           </a:p>
@@ -636,7 +637,7 @@
             <a:fld id="{0F85C38B-D7AD-4BD4-AA0D-2F7E2B607052}" type="datetimeFigureOut">
               <a:rPr lang="es-ES" smtClean="0"/>
               <a:pPr/>
-              <a:t>05/05/2020</a:t>
+              <a:t>14/05/2020</a:t>
             </a:fld>
             <a:endParaRPr lang="es-ES"/>
           </a:p>
@@ -803,7 +804,7 @@
             <a:fld id="{0F85C38B-D7AD-4BD4-AA0D-2F7E2B607052}" type="datetimeFigureOut">
               <a:rPr lang="es-ES" smtClean="0"/>
               <a:pPr/>
-              <a:t>05/05/2020</a:t>
+              <a:t>14/05/2020</a:t>
             </a:fld>
             <a:endParaRPr lang="es-ES"/>
           </a:p>
@@ -1046,7 +1047,7 @@
             <a:fld id="{0F85C38B-D7AD-4BD4-AA0D-2F7E2B607052}" type="datetimeFigureOut">
               <a:rPr lang="es-ES" smtClean="0"/>
               <a:pPr/>
-              <a:t>05/05/2020</a:t>
+              <a:t>14/05/2020</a:t>
             </a:fld>
             <a:endParaRPr lang="es-ES"/>
           </a:p>
@@ -1331,7 +1332,7 @@
             <a:fld id="{0F85C38B-D7AD-4BD4-AA0D-2F7E2B607052}" type="datetimeFigureOut">
               <a:rPr lang="es-ES" smtClean="0"/>
               <a:pPr/>
-              <a:t>05/05/2020</a:t>
+              <a:t>14/05/2020</a:t>
             </a:fld>
             <a:endParaRPr lang="es-ES"/>
           </a:p>
@@ -1750,7 +1751,7 @@
             <a:fld id="{0F85C38B-D7AD-4BD4-AA0D-2F7E2B607052}" type="datetimeFigureOut">
               <a:rPr lang="es-ES" smtClean="0"/>
               <a:pPr/>
-              <a:t>05/05/2020</a:t>
+              <a:t>14/05/2020</a:t>
             </a:fld>
             <a:endParaRPr lang="es-ES"/>
           </a:p>
@@ -1865,7 +1866,7 @@
             <a:fld id="{0F85C38B-D7AD-4BD4-AA0D-2F7E2B607052}" type="datetimeFigureOut">
               <a:rPr lang="es-ES" smtClean="0"/>
               <a:pPr/>
-              <a:t>05/05/2020</a:t>
+              <a:t>14/05/2020</a:t>
             </a:fld>
             <a:endParaRPr lang="es-ES"/>
           </a:p>
@@ -1957,7 +1958,7 @@
             <a:fld id="{0F85C38B-D7AD-4BD4-AA0D-2F7E2B607052}" type="datetimeFigureOut">
               <a:rPr lang="es-ES" smtClean="0"/>
               <a:pPr/>
-              <a:t>05/05/2020</a:t>
+              <a:t>14/05/2020</a:t>
             </a:fld>
             <a:endParaRPr lang="es-ES"/>
           </a:p>
@@ -2231,7 +2232,7 @@
             <a:fld id="{0F85C38B-D7AD-4BD4-AA0D-2F7E2B607052}" type="datetimeFigureOut">
               <a:rPr lang="es-ES" smtClean="0"/>
               <a:pPr/>
-              <a:t>05/05/2020</a:t>
+              <a:t>14/05/2020</a:t>
             </a:fld>
             <a:endParaRPr lang="es-ES"/>
           </a:p>
@@ -2481,7 +2482,7 @@
             <a:fld id="{0F85C38B-D7AD-4BD4-AA0D-2F7E2B607052}" type="datetimeFigureOut">
               <a:rPr lang="es-ES" smtClean="0"/>
               <a:pPr/>
-              <a:t>05/05/2020</a:t>
+              <a:t>14/05/2020</a:t>
             </a:fld>
             <a:endParaRPr lang="es-ES"/>
           </a:p>
@@ -2691,7 +2692,7 @@
             <a:fld id="{0F85C38B-D7AD-4BD4-AA0D-2F7E2B607052}" type="datetimeFigureOut">
               <a:rPr lang="es-ES" smtClean="0"/>
               <a:pPr/>
-              <a:t>05/05/2020</a:t>
+              <a:t>14/05/2020</a:t>
             </a:fld>
             <a:endParaRPr lang="es-ES"/>
           </a:p>
@@ -6327,6 +6328,1389 @@
               <a:t>Accessory Decoder</a:t>
             </a:r>
             <a:endParaRPr lang="en-GB" sz="1200" b="1" dirty="0"/>
+          </a:p>
+        </p:txBody>
+      </p:sp>
+    </p:spTree>
+  </p:cSld>
+  <p:clrMapOvr>
+    <a:masterClrMapping/>
+  </p:clrMapOvr>
+</p:sld>
+</file>
+
+<file path=ppt/slides/slide5.xml><?xml version="1.0" encoding="utf-8"?>
+<p:sld xmlns:a="http://schemas.openxmlformats.org/drawingml/2006/main" xmlns:r="http://schemas.openxmlformats.org/officeDocument/2006/relationships" xmlns:p="http://schemas.openxmlformats.org/presentationml/2006/main">
+  <p:cSld>
+    <p:spTree>
+      <p:nvGrpSpPr>
+        <p:cNvPr id="1" name=""/>
+        <p:cNvGrpSpPr/>
+        <p:nvPr/>
+      </p:nvGrpSpPr>
+      <p:grpSpPr>
+        <a:xfrm>
+          <a:off x="0" y="0"/>
+          <a:ext cx="0" cy="0"/>
+          <a:chOff x="0" y="0"/>
+          <a:chExt cx="0" cy="0"/>
+        </a:xfrm>
+      </p:grpSpPr>
+      <p:sp>
+        <p:nvSpPr>
+          <p:cNvPr id="59" name="58 Rectángulo"/>
+          <p:cNvSpPr/>
+          <p:nvPr/>
+        </p:nvSpPr>
+        <p:spPr>
+          <a:xfrm>
+            <a:off x="107504" y="188640"/>
+            <a:ext cx="2160240" cy="1008112"/>
+          </a:xfrm>
+          <a:prstGeom prst="rect">
+            <a:avLst/>
+          </a:prstGeom>
+        </p:spPr>
+        <p:style>
+          <a:lnRef idx="1">
+            <a:schemeClr val="accent3"/>
+          </a:lnRef>
+          <a:fillRef idx="2">
+            <a:schemeClr val="accent3"/>
+          </a:fillRef>
+          <a:effectRef idx="1">
+            <a:schemeClr val="accent3"/>
+          </a:effectRef>
+          <a:fontRef idx="minor">
+            <a:schemeClr val="dk1"/>
+          </a:fontRef>
+        </p:style>
+        <p:txBody>
+          <a:bodyPr rtlCol="0" anchor="ctr"/>
+          <a:lstStyle/>
+          <a:p>
+            <a:pPr algn="ctr"/>
+            <a:endParaRPr lang="en-GB"/>
+          </a:p>
+        </p:txBody>
+      </p:sp>
+      <p:sp>
+        <p:nvSpPr>
+          <p:cNvPr id="4" name="3 Proceso predefinido"/>
+          <p:cNvSpPr/>
+          <p:nvPr/>
+        </p:nvSpPr>
+        <p:spPr>
+          <a:xfrm>
+            <a:off x="4283968" y="404664"/>
+            <a:ext cx="1224136" cy="360040"/>
+          </a:xfrm>
+          <a:prstGeom prst="flowChartPredefinedProcess">
+            <a:avLst/>
+          </a:prstGeom>
+        </p:spPr>
+        <p:style>
+          <a:lnRef idx="1">
+            <a:schemeClr val="dk1"/>
+          </a:lnRef>
+          <a:fillRef idx="2">
+            <a:schemeClr val="dk1"/>
+          </a:fillRef>
+          <a:effectRef idx="1">
+            <a:schemeClr val="dk1"/>
+          </a:effectRef>
+          <a:fontRef idx="minor">
+            <a:schemeClr val="dk1"/>
+          </a:fontRef>
+        </p:style>
+        <p:txBody>
+          <a:bodyPr rtlCol="0" anchor="ctr"/>
+          <a:lstStyle/>
+          <a:p>
+            <a:pPr algn="ctr"/>
+            <a:r>
+              <a:rPr lang="en-GB" sz="1200" dirty="0" smtClean="0"/>
+              <a:t>FROM</a:t>
+            </a:r>
+            <a:endParaRPr lang="en-GB" sz="1200" dirty="0"/>
+          </a:p>
+        </p:txBody>
+      </p:sp>
+      <p:sp>
+        <p:nvSpPr>
+          <p:cNvPr id="7" name="6 Preparación"/>
+          <p:cNvSpPr/>
+          <p:nvPr/>
+        </p:nvSpPr>
+        <p:spPr>
+          <a:xfrm>
+            <a:off x="3203848" y="1412776"/>
+            <a:ext cx="1296144" cy="360040"/>
+          </a:xfrm>
+          <a:prstGeom prst="flowChartPreparation">
+            <a:avLst/>
+          </a:prstGeom>
+        </p:spPr>
+        <p:style>
+          <a:lnRef idx="1">
+            <a:schemeClr val="accent4"/>
+          </a:lnRef>
+          <a:fillRef idx="2">
+            <a:schemeClr val="accent4"/>
+          </a:fillRef>
+          <a:effectRef idx="1">
+            <a:schemeClr val="accent4"/>
+          </a:effectRef>
+          <a:fontRef idx="minor">
+            <a:schemeClr val="dk1"/>
+          </a:fontRef>
+        </p:style>
+        <p:txBody>
+          <a:bodyPr rtlCol="0" anchor="ctr"/>
+          <a:lstStyle/>
+          <a:p>
+            <a:pPr algn="ctr"/>
+            <a:r>
+              <a:rPr lang="en-GB" sz="1100" dirty="0" smtClean="0"/>
+              <a:t>BLOCK B1</a:t>
+            </a:r>
+            <a:endParaRPr lang="en-GB" sz="1100" dirty="0"/>
+          </a:p>
+        </p:txBody>
+      </p:sp>
+      <p:sp>
+        <p:nvSpPr>
+          <p:cNvPr id="8" name="7 Preparación"/>
+          <p:cNvSpPr/>
+          <p:nvPr/>
+        </p:nvSpPr>
+        <p:spPr>
+          <a:xfrm>
+            <a:off x="5364088" y="1412776"/>
+            <a:ext cx="1296144" cy="360040"/>
+          </a:xfrm>
+          <a:prstGeom prst="flowChartPreparation">
+            <a:avLst/>
+          </a:prstGeom>
+        </p:spPr>
+        <p:style>
+          <a:lnRef idx="1">
+            <a:schemeClr val="accent4"/>
+          </a:lnRef>
+          <a:fillRef idx="2">
+            <a:schemeClr val="accent4"/>
+          </a:fillRef>
+          <a:effectRef idx="1">
+            <a:schemeClr val="accent4"/>
+          </a:effectRef>
+          <a:fontRef idx="minor">
+            <a:schemeClr val="dk1"/>
+          </a:fontRef>
+        </p:style>
+        <p:txBody>
+          <a:bodyPr rtlCol="0" anchor="ctr"/>
+          <a:lstStyle/>
+          <a:p>
+            <a:pPr algn="ctr"/>
+            <a:r>
+              <a:rPr lang="en-GB" sz="1100" dirty="0" smtClean="0"/>
+              <a:t>BLOCK B2</a:t>
+            </a:r>
+            <a:endParaRPr lang="en-GB" sz="1100" dirty="0"/>
+          </a:p>
+        </p:txBody>
+      </p:sp>
+      <p:cxnSp>
+        <p:nvCxnSpPr>
+          <p:cNvPr id="10" name="9 Conector recto de flecha"/>
+          <p:cNvCxnSpPr>
+            <a:stCxn id="4" idx="2"/>
+            <a:endCxn id="7" idx="0"/>
+          </p:cNvCxnSpPr>
+          <p:nvPr/>
+        </p:nvCxnSpPr>
+        <p:spPr>
+          <a:xfrm flipH="1">
+            <a:off x="3851920" y="764704"/>
+            <a:ext cx="1044116" cy="648072"/>
+          </a:xfrm>
+          <a:prstGeom prst="straightConnector1">
+            <a:avLst/>
+          </a:prstGeom>
+          <a:ln>
+            <a:tailEnd type="arrow"/>
+          </a:ln>
+        </p:spPr>
+        <p:style>
+          <a:lnRef idx="1">
+            <a:schemeClr val="accent1"/>
+          </a:lnRef>
+          <a:fillRef idx="0">
+            <a:schemeClr val="accent1"/>
+          </a:fillRef>
+          <a:effectRef idx="0">
+            <a:schemeClr val="accent1"/>
+          </a:effectRef>
+          <a:fontRef idx="minor">
+            <a:schemeClr val="tx1"/>
+          </a:fontRef>
+        </p:style>
+      </p:cxnSp>
+      <p:cxnSp>
+        <p:nvCxnSpPr>
+          <p:cNvPr id="12" name="11 Conector recto de flecha"/>
+          <p:cNvCxnSpPr>
+            <a:stCxn id="4" idx="2"/>
+            <a:endCxn id="8" idx="0"/>
+          </p:cNvCxnSpPr>
+          <p:nvPr/>
+        </p:nvCxnSpPr>
+        <p:spPr>
+          <a:xfrm>
+            <a:off x="4896036" y="764704"/>
+            <a:ext cx="1116124" cy="648072"/>
+          </a:xfrm>
+          <a:prstGeom prst="straightConnector1">
+            <a:avLst/>
+          </a:prstGeom>
+          <a:ln>
+            <a:tailEnd type="arrow"/>
+          </a:ln>
+        </p:spPr>
+        <p:style>
+          <a:lnRef idx="1">
+            <a:schemeClr val="accent1"/>
+          </a:lnRef>
+          <a:fillRef idx="0">
+            <a:schemeClr val="accent1"/>
+          </a:fillRef>
+          <a:effectRef idx="0">
+            <a:schemeClr val="accent1"/>
+          </a:effectRef>
+          <a:fontRef idx="minor">
+            <a:schemeClr val="tx1"/>
+          </a:fontRef>
+        </p:style>
+      </p:cxnSp>
+      <p:sp>
+        <p:nvSpPr>
+          <p:cNvPr id="13" name="12 Proceso predefinido"/>
+          <p:cNvSpPr/>
+          <p:nvPr/>
+        </p:nvSpPr>
+        <p:spPr>
+          <a:xfrm>
+            <a:off x="4355976" y="3501008"/>
+            <a:ext cx="1224136" cy="360040"/>
+          </a:xfrm>
+          <a:prstGeom prst="flowChartPredefinedProcess">
+            <a:avLst/>
+          </a:prstGeom>
+        </p:spPr>
+        <p:style>
+          <a:lnRef idx="1">
+            <a:schemeClr val="accent1"/>
+          </a:lnRef>
+          <a:fillRef idx="2">
+            <a:schemeClr val="accent1"/>
+          </a:fillRef>
+          <a:effectRef idx="1">
+            <a:schemeClr val="accent1"/>
+          </a:effectRef>
+          <a:fontRef idx="minor">
+            <a:schemeClr val="dk1"/>
+          </a:fontRef>
+        </p:style>
+        <p:txBody>
+          <a:bodyPr rtlCol="0" anchor="ctr"/>
+          <a:lstStyle/>
+          <a:p>
+            <a:pPr algn="ctr"/>
+            <a:r>
+              <a:rPr lang="en-GB" sz="1100" dirty="0" smtClean="0"/>
+              <a:t>BLOCK B5</a:t>
+            </a:r>
+            <a:endParaRPr lang="en-GB" sz="1100" dirty="0"/>
+          </a:p>
+        </p:txBody>
+      </p:sp>
+      <p:sp>
+        <p:nvSpPr>
+          <p:cNvPr id="14" name="13 Proceso predefinido"/>
+          <p:cNvSpPr/>
+          <p:nvPr/>
+        </p:nvSpPr>
+        <p:spPr>
+          <a:xfrm>
+            <a:off x="5904148" y="3501008"/>
+            <a:ext cx="1224136" cy="360040"/>
+          </a:xfrm>
+          <a:prstGeom prst="flowChartPredefinedProcess">
+            <a:avLst/>
+          </a:prstGeom>
+        </p:spPr>
+        <p:style>
+          <a:lnRef idx="1">
+            <a:schemeClr val="accent1"/>
+          </a:lnRef>
+          <a:fillRef idx="2">
+            <a:schemeClr val="accent1"/>
+          </a:fillRef>
+          <a:effectRef idx="1">
+            <a:schemeClr val="accent1"/>
+          </a:effectRef>
+          <a:fontRef idx="minor">
+            <a:schemeClr val="dk1"/>
+          </a:fontRef>
+        </p:style>
+        <p:txBody>
+          <a:bodyPr rtlCol="0" anchor="ctr"/>
+          <a:lstStyle/>
+          <a:p>
+            <a:pPr algn="ctr"/>
+            <a:r>
+              <a:rPr lang="en-GB" sz="1100" dirty="0" smtClean="0"/>
+              <a:t>BLOCK B6</a:t>
+            </a:r>
+            <a:endParaRPr lang="en-GB" sz="1100" dirty="0"/>
+          </a:p>
+        </p:txBody>
+      </p:sp>
+      <p:sp>
+        <p:nvSpPr>
+          <p:cNvPr id="15" name="14 Preparación"/>
+          <p:cNvSpPr/>
+          <p:nvPr/>
+        </p:nvSpPr>
+        <p:spPr>
+          <a:xfrm>
+            <a:off x="5364088" y="2348880"/>
+            <a:ext cx="1296144" cy="360040"/>
+          </a:xfrm>
+          <a:prstGeom prst="flowChartPreparation">
+            <a:avLst/>
+          </a:prstGeom>
+        </p:spPr>
+        <p:style>
+          <a:lnRef idx="1">
+            <a:schemeClr val="accent4"/>
+          </a:lnRef>
+          <a:fillRef idx="2">
+            <a:schemeClr val="accent4"/>
+          </a:fillRef>
+          <a:effectRef idx="1">
+            <a:schemeClr val="accent4"/>
+          </a:effectRef>
+          <a:fontRef idx="minor">
+            <a:schemeClr val="dk1"/>
+          </a:fontRef>
+        </p:style>
+        <p:txBody>
+          <a:bodyPr rtlCol="0" anchor="ctr"/>
+          <a:lstStyle/>
+          <a:p>
+            <a:pPr algn="ctr"/>
+            <a:r>
+              <a:rPr lang="en-GB" sz="1100" dirty="0" smtClean="0"/>
+              <a:t>BLOCK B3</a:t>
+            </a:r>
+            <a:endParaRPr lang="en-GB" sz="1100" dirty="0"/>
+          </a:p>
+        </p:txBody>
+      </p:sp>
+      <p:cxnSp>
+        <p:nvCxnSpPr>
+          <p:cNvPr id="17" name="16 Conector recto de flecha"/>
+          <p:cNvCxnSpPr>
+            <a:stCxn id="8" idx="2"/>
+            <a:endCxn id="15" idx="0"/>
+          </p:cNvCxnSpPr>
+          <p:nvPr/>
+        </p:nvCxnSpPr>
+        <p:spPr>
+          <a:xfrm>
+            <a:off x="6012160" y="1772816"/>
+            <a:ext cx="0" cy="576064"/>
+          </a:xfrm>
+          <a:prstGeom prst="straightConnector1">
+            <a:avLst/>
+          </a:prstGeom>
+          <a:ln>
+            <a:tailEnd type="arrow"/>
+          </a:ln>
+        </p:spPr>
+        <p:style>
+          <a:lnRef idx="1">
+            <a:schemeClr val="accent1"/>
+          </a:lnRef>
+          <a:fillRef idx="0">
+            <a:schemeClr val="accent1"/>
+          </a:fillRef>
+          <a:effectRef idx="0">
+            <a:schemeClr val="accent1"/>
+          </a:effectRef>
+          <a:fontRef idx="minor">
+            <a:schemeClr val="tx1"/>
+          </a:fontRef>
+        </p:style>
+      </p:cxnSp>
+      <p:cxnSp>
+        <p:nvCxnSpPr>
+          <p:cNvPr id="19" name="18 Conector recto de flecha"/>
+          <p:cNvCxnSpPr>
+            <a:stCxn id="7" idx="2"/>
+            <a:endCxn id="26" idx="0"/>
+          </p:cNvCxnSpPr>
+          <p:nvPr/>
+        </p:nvCxnSpPr>
+        <p:spPr>
+          <a:xfrm flipH="1">
+            <a:off x="3419872" y="1772816"/>
+            <a:ext cx="432048" cy="1728192"/>
+          </a:xfrm>
+          <a:prstGeom prst="straightConnector1">
+            <a:avLst/>
+          </a:prstGeom>
+          <a:ln>
+            <a:tailEnd type="arrow"/>
+          </a:ln>
+        </p:spPr>
+        <p:style>
+          <a:lnRef idx="1">
+            <a:schemeClr val="accent1"/>
+          </a:lnRef>
+          <a:fillRef idx="0">
+            <a:schemeClr val="accent1"/>
+          </a:fillRef>
+          <a:effectRef idx="0">
+            <a:schemeClr val="accent1"/>
+          </a:effectRef>
+          <a:fontRef idx="minor">
+            <a:schemeClr val="tx1"/>
+          </a:fontRef>
+        </p:style>
+      </p:cxnSp>
+      <p:cxnSp>
+        <p:nvCxnSpPr>
+          <p:cNvPr id="23" name="22 Conector recto de flecha"/>
+          <p:cNvCxnSpPr>
+            <a:stCxn id="15" idx="2"/>
+            <a:endCxn id="14" idx="0"/>
+          </p:cNvCxnSpPr>
+          <p:nvPr/>
+        </p:nvCxnSpPr>
+        <p:spPr>
+          <a:xfrm>
+            <a:off x="6012160" y="2708920"/>
+            <a:ext cx="504056" cy="792088"/>
+          </a:xfrm>
+          <a:prstGeom prst="straightConnector1">
+            <a:avLst/>
+          </a:prstGeom>
+          <a:ln>
+            <a:tailEnd type="arrow"/>
+          </a:ln>
+        </p:spPr>
+        <p:style>
+          <a:lnRef idx="1">
+            <a:schemeClr val="accent1"/>
+          </a:lnRef>
+          <a:fillRef idx="0">
+            <a:schemeClr val="accent1"/>
+          </a:fillRef>
+          <a:effectRef idx="0">
+            <a:schemeClr val="accent1"/>
+          </a:effectRef>
+          <a:fontRef idx="minor">
+            <a:schemeClr val="tx1"/>
+          </a:fontRef>
+        </p:style>
+      </p:cxnSp>
+      <p:cxnSp>
+        <p:nvCxnSpPr>
+          <p:cNvPr id="25" name="24 Conector recto de flecha"/>
+          <p:cNvCxnSpPr>
+            <a:stCxn id="15" idx="2"/>
+            <a:endCxn id="13" idx="0"/>
+          </p:cNvCxnSpPr>
+          <p:nvPr/>
+        </p:nvCxnSpPr>
+        <p:spPr>
+          <a:xfrm flipH="1">
+            <a:off x="4968044" y="2708920"/>
+            <a:ext cx="1044116" cy="792088"/>
+          </a:xfrm>
+          <a:prstGeom prst="straightConnector1">
+            <a:avLst/>
+          </a:prstGeom>
+          <a:ln>
+            <a:tailEnd type="arrow"/>
+          </a:ln>
+        </p:spPr>
+        <p:style>
+          <a:lnRef idx="1">
+            <a:schemeClr val="accent1"/>
+          </a:lnRef>
+          <a:fillRef idx="0">
+            <a:schemeClr val="accent1"/>
+          </a:fillRef>
+          <a:effectRef idx="0">
+            <a:schemeClr val="accent1"/>
+          </a:effectRef>
+          <a:fontRef idx="minor">
+            <a:schemeClr val="tx1"/>
+          </a:fontRef>
+        </p:style>
+      </p:cxnSp>
+      <p:sp>
+        <p:nvSpPr>
+          <p:cNvPr id="26" name="25 Preparación"/>
+          <p:cNvSpPr/>
+          <p:nvPr/>
+        </p:nvSpPr>
+        <p:spPr>
+          <a:xfrm>
+            <a:off x="2771800" y="3501008"/>
+            <a:ext cx="1296144" cy="360040"/>
+          </a:xfrm>
+          <a:prstGeom prst="flowChartPreparation">
+            <a:avLst/>
+          </a:prstGeom>
+        </p:spPr>
+        <p:style>
+          <a:lnRef idx="1">
+            <a:schemeClr val="accent4"/>
+          </a:lnRef>
+          <a:fillRef idx="2">
+            <a:schemeClr val="accent4"/>
+          </a:fillRef>
+          <a:effectRef idx="1">
+            <a:schemeClr val="accent4"/>
+          </a:effectRef>
+          <a:fontRef idx="minor">
+            <a:schemeClr val="dk1"/>
+          </a:fontRef>
+        </p:style>
+        <p:txBody>
+          <a:bodyPr rtlCol="0" anchor="ctr"/>
+          <a:lstStyle/>
+          <a:p>
+            <a:pPr algn="ctr"/>
+            <a:r>
+              <a:rPr lang="en-GB" sz="1100" dirty="0" smtClean="0"/>
+              <a:t>BLOCK B4</a:t>
+            </a:r>
+            <a:endParaRPr lang="en-GB" sz="1100" dirty="0"/>
+          </a:p>
+        </p:txBody>
+      </p:sp>
+      <p:sp>
+        <p:nvSpPr>
+          <p:cNvPr id="29" name="28 Proceso predefinido"/>
+          <p:cNvSpPr/>
+          <p:nvPr/>
+        </p:nvSpPr>
+        <p:spPr>
+          <a:xfrm>
+            <a:off x="2807804" y="4797152"/>
+            <a:ext cx="1224136" cy="360040"/>
+          </a:xfrm>
+          <a:prstGeom prst="flowChartPredefinedProcess">
+            <a:avLst/>
+          </a:prstGeom>
+        </p:spPr>
+        <p:style>
+          <a:lnRef idx="1">
+            <a:schemeClr val="dk1"/>
+          </a:lnRef>
+          <a:fillRef idx="2">
+            <a:schemeClr val="dk1"/>
+          </a:fillRef>
+          <a:effectRef idx="1">
+            <a:schemeClr val="dk1"/>
+          </a:effectRef>
+          <a:fontRef idx="minor">
+            <a:schemeClr val="dk1"/>
+          </a:fontRef>
+        </p:style>
+        <p:txBody>
+          <a:bodyPr rtlCol="0" anchor="ctr"/>
+          <a:lstStyle/>
+          <a:p>
+            <a:pPr algn="ctr"/>
+            <a:r>
+              <a:rPr lang="en-GB" sz="1200" dirty="0" smtClean="0"/>
+              <a:t>FROM</a:t>
+            </a:r>
+            <a:endParaRPr lang="en-GB" sz="1200" dirty="0"/>
+          </a:p>
+        </p:txBody>
+      </p:sp>
+      <p:cxnSp>
+        <p:nvCxnSpPr>
+          <p:cNvPr id="31" name="30 Conector recto de flecha"/>
+          <p:cNvCxnSpPr/>
+          <p:nvPr/>
+        </p:nvCxnSpPr>
+        <p:spPr>
+          <a:xfrm>
+            <a:off x="3419872" y="3861048"/>
+            <a:ext cx="0" cy="936104"/>
+          </a:xfrm>
+          <a:prstGeom prst="straightConnector1">
+            <a:avLst/>
+          </a:prstGeom>
+          <a:ln>
+            <a:tailEnd type="arrow"/>
+          </a:ln>
+        </p:spPr>
+        <p:style>
+          <a:lnRef idx="1">
+            <a:schemeClr val="accent1"/>
+          </a:lnRef>
+          <a:fillRef idx="0">
+            <a:schemeClr val="accent1"/>
+          </a:fillRef>
+          <a:effectRef idx="0">
+            <a:schemeClr val="accent1"/>
+          </a:effectRef>
+          <a:fontRef idx="minor">
+            <a:schemeClr val="tx1"/>
+          </a:fontRef>
+        </p:style>
+      </p:cxnSp>
+      <p:sp>
+        <p:nvSpPr>
+          <p:cNvPr id="32" name="31 CuadroTexto"/>
+          <p:cNvSpPr txBox="1"/>
+          <p:nvPr/>
+        </p:nvSpPr>
+        <p:spPr>
+          <a:xfrm>
+            <a:off x="4283968" y="1052736"/>
+            <a:ext cx="598241" cy="246221"/>
+          </a:xfrm>
+          <a:prstGeom prst="rect">
+            <a:avLst/>
+          </a:prstGeom>
+          <a:noFill/>
+        </p:spPr>
+        <p:txBody>
+          <a:bodyPr wrap="none" rtlCol="0">
+            <a:spAutoFit/>
+          </a:bodyPr>
+          <a:lstStyle/>
+          <a:p>
+            <a:r>
+              <a:rPr lang="en-GB" sz="1000" dirty="0" smtClean="0"/>
+              <a:t>Route A</a:t>
+            </a:r>
+            <a:endParaRPr lang="en-GB" sz="1000" dirty="0"/>
+          </a:p>
+        </p:txBody>
+      </p:sp>
+      <p:sp>
+        <p:nvSpPr>
+          <p:cNvPr id="33" name="32 CuadroTexto"/>
+          <p:cNvSpPr txBox="1"/>
+          <p:nvPr/>
+        </p:nvSpPr>
+        <p:spPr>
+          <a:xfrm>
+            <a:off x="5436096" y="908720"/>
+            <a:ext cx="595035" cy="246221"/>
+          </a:xfrm>
+          <a:prstGeom prst="rect">
+            <a:avLst/>
+          </a:prstGeom>
+          <a:noFill/>
+        </p:spPr>
+        <p:txBody>
+          <a:bodyPr wrap="none" rtlCol="0">
+            <a:spAutoFit/>
+          </a:bodyPr>
+          <a:lstStyle/>
+          <a:p>
+            <a:r>
+              <a:rPr lang="en-GB" sz="1000" dirty="0" smtClean="0"/>
+              <a:t>Route B</a:t>
+            </a:r>
+            <a:endParaRPr lang="en-GB" sz="1000" dirty="0"/>
+          </a:p>
+        </p:txBody>
+      </p:sp>
+      <p:sp>
+        <p:nvSpPr>
+          <p:cNvPr id="34" name="33 CuadroTexto"/>
+          <p:cNvSpPr txBox="1"/>
+          <p:nvPr/>
+        </p:nvSpPr>
+        <p:spPr>
+          <a:xfrm>
+            <a:off x="3131840" y="2420888"/>
+            <a:ext cx="595035" cy="246221"/>
+          </a:xfrm>
+          <a:prstGeom prst="rect">
+            <a:avLst/>
+          </a:prstGeom>
+          <a:noFill/>
+        </p:spPr>
+        <p:txBody>
+          <a:bodyPr wrap="none" rtlCol="0">
+            <a:spAutoFit/>
+          </a:bodyPr>
+          <a:lstStyle/>
+          <a:p>
+            <a:r>
+              <a:rPr lang="en-GB" sz="1000" dirty="0" smtClean="0"/>
+              <a:t>Route C</a:t>
+            </a:r>
+            <a:endParaRPr lang="en-GB" sz="1000" dirty="0"/>
+          </a:p>
+        </p:txBody>
+      </p:sp>
+      <p:sp>
+        <p:nvSpPr>
+          <p:cNvPr id="35" name="34 CuadroTexto"/>
+          <p:cNvSpPr txBox="1"/>
+          <p:nvPr/>
+        </p:nvSpPr>
+        <p:spPr>
+          <a:xfrm>
+            <a:off x="2888830" y="4190891"/>
+            <a:ext cx="603050" cy="246221"/>
+          </a:xfrm>
+          <a:prstGeom prst="rect">
+            <a:avLst/>
+          </a:prstGeom>
+          <a:noFill/>
+        </p:spPr>
+        <p:txBody>
+          <a:bodyPr wrap="none" rtlCol="0">
+            <a:spAutoFit/>
+          </a:bodyPr>
+          <a:lstStyle/>
+          <a:p>
+            <a:r>
+              <a:rPr lang="en-GB" sz="1000" dirty="0" smtClean="0"/>
+              <a:t>Route D</a:t>
+            </a:r>
+            <a:endParaRPr lang="en-GB" sz="1000" dirty="0"/>
+          </a:p>
+        </p:txBody>
+      </p:sp>
+      <p:cxnSp>
+        <p:nvCxnSpPr>
+          <p:cNvPr id="37" name="36 Conector recto de flecha"/>
+          <p:cNvCxnSpPr>
+            <a:stCxn id="13" idx="2"/>
+            <a:endCxn id="29" idx="0"/>
+          </p:cNvCxnSpPr>
+          <p:nvPr/>
+        </p:nvCxnSpPr>
+        <p:spPr>
+          <a:xfrm flipH="1">
+            <a:off x="3419872" y="3861048"/>
+            <a:ext cx="1548172" cy="936104"/>
+          </a:xfrm>
+          <a:prstGeom prst="straightConnector1">
+            <a:avLst/>
+          </a:prstGeom>
+          <a:ln>
+            <a:tailEnd type="arrow"/>
+          </a:ln>
+        </p:spPr>
+        <p:style>
+          <a:lnRef idx="1">
+            <a:schemeClr val="accent1"/>
+          </a:lnRef>
+          <a:fillRef idx="0">
+            <a:schemeClr val="accent1"/>
+          </a:fillRef>
+          <a:effectRef idx="0">
+            <a:schemeClr val="accent1"/>
+          </a:effectRef>
+          <a:fontRef idx="minor">
+            <a:schemeClr val="tx1"/>
+          </a:fontRef>
+        </p:style>
+      </p:cxnSp>
+      <p:sp>
+        <p:nvSpPr>
+          <p:cNvPr id="38" name="37 Preparación"/>
+          <p:cNvSpPr/>
+          <p:nvPr/>
+        </p:nvSpPr>
+        <p:spPr>
+          <a:xfrm>
+            <a:off x="5868144" y="4437112"/>
+            <a:ext cx="1296144" cy="360040"/>
+          </a:xfrm>
+          <a:prstGeom prst="flowChartPreparation">
+            <a:avLst/>
+          </a:prstGeom>
+        </p:spPr>
+        <p:style>
+          <a:lnRef idx="1">
+            <a:schemeClr val="accent4"/>
+          </a:lnRef>
+          <a:fillRef idx="2">
+            <a:schemeClr val="accent4"/>
+          </a:fillRef>
+          <a:effectRef idx="1">
+            <a:schemeClr val="accent4"/>
+          </a:effectRef>
+          <a:fontRef idx="minor">
+            <a:schemeClr val="dk1"/>
+          </a:fontRef>
+        </p:style>
+        <p:txBody>
+          <a:bodyPr rtlCol="0" anchor="ctr"/>
+          <a:lstStyle/>
+          <a:p>
+            <a:pPr algn="ctr"/>
+            <a:r>
+              <a:rPr lang="en-GB" sz="1100" dirty="0" smtClean="0"/>
+              <a:t>BLOCK B3</a:t>
+            </a:r>
+            <a:endParaRPr lang="en-GB" sz="1100" dirty="0"/>
+          </a:p>
+        </p:txBody>
+      </p:sp>
+      <p:cxnSp>
+        <p:nvCxnSpPr>
+          <p:cNvPr id="40" name="39 Conector recto de flecha"/>
+          <p:cNvCxnSpPr>
+            <a:endCxn id="38" idx="0"/>
+          </p:cNvCxnSpPr>
+          <p:nvPr/>
+        </p:nvCxnSpPr>
+        <p:spPr>
+          <a:xfrm>
+            <a:off x="6516216" y="3861048"/>
+            <a:ext cx="0" cy="576064"/>
+          </a:xfrm>
+          <a:prstGeom prst="straightConnector1">
+            <a:avLst/>
+          </a:prstGeom>
+          <a:ln>
+            <a:tailEnd type="arrow"/>
+          </a:ln>
+        </p:spPr>
+        <p:style>
+          <a:lnRef idx="1">
+            <a:schemeClr val="accent1"/>
+          </a:lnRef>
+          <a:fillRef idx="0">
+            <a:schemeClr val="accent1"/>
+          </a:fillRef>
+          <a:effectRef idx="0">
+            <a:schemeClr val="accent1"/>
+          </a:effectRef>
+          <a:fontRef idx="minor">
+            <a:schemeClr val="tx1"/>
+          </a:fontRef>
+        </p:style>
+      </p:cxnSp>
+      <p:sp>
+        <p:nvSpPr>
+          <p:cNvPr id="42" name="41 CuadroTexto"/>
+          <p:cNvSpPr txBox="1"/>
+          <p:nvPr/>
+        </p:nvSpPr>
+        <p:spPr>
+          <a:xfrm>
+            <a:off x="5985174" y="1958643"/>
+            <a:ext cx="603050" cy="246221"/>
+          </a:xfrm>
+          <a:prstGeom prst="rect">
+            <a:avLst/>
+          </a:prstGeom>
+          <a:noFill/>
+        </p:spPr>
+        <p:txBody>
+          <a:bodyPr wrap="none" rtlCol="0">
+            <a:spAutoFit/>
+          </a:bodyPr>
+          <a:lstStyle/>
+          <a:p>
+            <a:r>
+              <a:rPr lang="en-GB" sz="1000" dirty="0" smtClean="0"/>
+              <a:t>Route F</a:t>
+            </a:r>
+            <a:endParaRPr lang="en-GB" sz="1000" dirty="0"/>
+          </a:p>
+        </p:txBody>
+      </p:sp>
+      <p:sp>
+        <p:nvSpPr>
+          <p:cNvPr id="43" name="42 CuadroTexto"/>
+          <p:cNvSpPr txBox="1"/>
+          <p:nvPr/>
+        </p:nvSpPr>
+        <p:spPr>
+          <a:xfrm>
+            <a:off x="4932040" y="2924944"/>
+            <a:ext cx="603050" cy="246221"/>
+          </a:xfrm>
+          <a:prstGeom prst="rect">
+            <a:avLst/>
+          </a:prstGeom>
+          <a:noFill/>
+        </p:spPr>
+        <p:txBody>
+          <a:bodyPr wrap="none" rtlCol="0">
+            <a:spAutoFit/>
+          </a:bodyPr>
+          <a:lstStyle/>
+          <a:p>
+            <a:r>
+              <a:rPr lang="en-GB" sz="1000" dirty="0" smtClean="0"/>
+              <a:t>Route G</a:t>
+            </a:r>
+            <a:endParaRPr lang="en-GB" sz="1000" dirty="0"/>
+          </a:p>
+        </p:txBody>
+      </p:sp>
+      <p:sp>
+        <p:nvSpPr>
+          <p:cNvPr id="44" name="43 CuadroTexto"/>
+          <p:cNvSpPr txBox="1"/>
+          <p:nvPr/>
+        </p:nvSpPr>
+        <p:spPr>
+          <a:xfrm>
+            <a:off x="6228184" y="2924944"/>
+            <a:ext cx="603050" cy="246221"/>
+          </a:xfrm>
+          <a:prstGeom prst="rect">
+            <a:avLst/>
+          </a:prstGeom>
+          <a:noFill/>
+        </p:spPr>
+        <p:txBody>
+          <a:bodyPr wrap="none" rtlCol="0">
+            <a:spAutoFit/>
+          </a:bodyPr>
+          <a:lstStyle/>
+          <a:p>
+            <a:r>
+              <a:rPr lang="en-GB" sz="1000" dirty="0" smtClean="0"/>
+              <a:t>Route H</a:t>
+            </a:r>
+            <a:endParaRPr lang="en-GB" sz="1000" dirty="0"/>
+          </a:p>
+        </p:txBody>
+      </p:sp>
+      <p:sp>
+        <p:nvSpPr>
+          <p:cNvPr id="45" name="44 CuadroTexto"/>
+          <p:cNvSpPr txBox="1"/>
+          <p:nvPr/>
+        </p:nvSpPr>
+        <p:spPr>
+          <a:xfrm>
+            <a:off x="6491833" y="4038972"/>
+            <a:ext cx="556563" cy="246221"/>
+          </a:xfrm>
+          <a:prstGeom prst="rect">
+            <a:avLst/>
+          </a:prstGeom>
+          <a:noFill/>
+        </p:spPr>
+        <p:txBody>
+          <a:bodyPr wrap="none" rtlCol="0">
+            <a:spAutoFit/>
+          </a:bodyPr>
+          <a:lstStyle/>
+          <a:p>
+            <a:r>
+              <a:rPr lang="en-GB" sz="1000" dirty="0" smtClean="0"/>
+              <a:t>Route I</a:t>
+            </a:r>
+            <a:endParaRPr lang="en-GB" sz="1000" dirty="0"/>
+          </a:p>
+        </p:txBody>
+      </p:sp>
+      <p:sp>
+        <p:nvSpPr>
+          <p:cNvPr id="46" name="45 Preparación"/>
+          <p:cNvSpPr/>
+          <p:nvPr/>
+        </p:nvSpPr>
+        <p:spPr>
+          <a:xfrm>
+            <a:off x="5868144" y="5301208"/>
+            <a:ext cx="1296144" cy="360040"/>
+          </a:xfrm>
+          <a:prstGeom prst="flowChartPreparation">
+            <a:avLst/>
+          </a:prstGeom>
+        </p:spPr>
+        <p:style>
+          <a:lnRef idx="1">
+            <a:schemeClr val="accent4"/>
+          </a:lnRef>
+          <a:fillRef idx="2">
+            <a:schemeClr val="accent4"/>
+          </a:fillRef>
+          <a:effectRef idx="1">
+            <a:schemeClr val="accent4"/>
+          </a:effectRef>
+          <a:fontRef idx="minor">
+            <a:schemeClr val="dk1"/>
+          </a:fontRef>
+        </p:style>
+        <p:txBody>
+          <a:bodyPr rtlCol="0" anchor="ctr"/>
+          <a:lstStyle/>
+          <a:p>
+            <a:pPr algn="ctr"/>
+            <a:r>
+              <a:rPr lang="en-GB" sz="1100" dirty="0" smtClean="0"/>
+              <a:t>BLOCK B2</a:t>
+            </a:r>
+            <a:endParaRPr lang="en-GB" sz="1100" dirty="0"/>
+          </a:p>
+        </p:txBody>
+      </p:sp>
+      <p:cxnSp>
+        <p:nvCxnSpPr>
+          <p:cNvPr id="48" name="47 Conector recto de flecha"/>
+          <p:cNvCxnSpPr>
+            <a:stCxn id="38" idx="2"/>
+            <a:endCxn id="46" idx="0"/>
+          </p:cNvCxnSpPr>
+          <p:nvPr/>
+        </p:nvCxnSpPr>
+        <p:spPr>
+          <a:xfrm>
+            <a:off x="6516216" y="4797152"/>
+            <a:ext cx="0" cy="504056"/>
+          </a:xfrm>
+          <a:prstGeom prst="straightConnector1">
+            <a:avLst/>
+          </a:prstGeom>
+          <a:ln>
+            <a:tailEnd type="arrow"/>
+          </a:ln>
+        </p:spPr>
+        <p:style>
+          <a:lnRef idx="1">
+            <a:schemeClr val="accent1"/>
+          </a:lnRef>
+          <a:fillRef idx="0">
+            <a:schemeClr val="accent1"/>
+          </a:fillRef>
+          <a:effectRef idx="0">
+            <a:schemeClr val="accent1"/>
+          </a:effectRef>
+          <a:fontRef idx="minor">
+            <a:schemeClr val="tx1"/>
+          </a:fontRef>
+        </p:style>
+      </p:cxnSp>
+      <p:sp>
+        <p:nvSpPr>
+          <p:cNvPr id="49" name="48 Proceso predefinido"/>
+          <p:cNvSpPr/>
+          <p:nvPr/>
+        </p:nvSpPr>
+        <p:spPr>
+          <a:xfrm>
+            <a:off x="5904148" y="6093296"/>
+            <a:ext cx="1224136" cy="360040"/>
+          </a:xfrm>
+          <a:prstGeom prst="flowChartPredefinedProcess">
+            <a:avLst/>
+          </a:prstGeom>
+        </p:spPr>
+        <p:style>
+          <a:lnRef idx="1">
+            <a:schemeClr val="dk1"/>
+          </a:lnRef>
+          <a:fillRef idx="2">
+            <a:schemeClr val="dk1"/>
+          </a:fillRef>
+          <a:effectRef idx="1">
+            <a:schemeClr val="dk1"/>
+          </a:effectRef>
+          <a:fontRef idx="minor">
+            <a:schemeClr val="dk1"/>
+          </a:fontRef>
+        </p:style>
+        <p:txBody>
+          <a:bodyPr rtlCol="0" anchor="ctr"/>
+          <a:lstStyle/>
+          <a:p>
+            <a:pPr algn="ctr"/>
+            <a:r>
+              <a:rPr lang="en-GB" sz="1200" dirty="0" smtClean="0"/>
+              <a:t>FROM</a:t>
+            </a:r>
+            <a:endParaRPr lang="en-GB" sz="1200" dirty="0"/>
+          </a:p>
+        </p:txBody>
+      </p:sp>
+      <p:cxnSp>
+        <p:nvCxnSpPr>
+          <p:cNvPr id="51" name="50 Conector recto de flecha"/>
+          <p:cNvCxnSpPr>
+            <a:stCxn id="46" idx="2"/>
+            <a:endCxn id="49" idx="0"/>
+          </p:cNvCxnSpPr>
+          <p:nvPr/>
+        </p:nvCxnSpPr>
+        <p:spPr>
+          <a:xfrm>
+            <a:off x="6516216" y="5661248"/>
+            <a:ext cx="0" cy="432048"/>
+          </a:xfrm>
+          <a:prstGeom prst="straightConnector1">
+            <a:avLst/>
+          </a:prstGeom>
+          <a:ln>
+            <a:tailEnd type="arrow"/>
+          </a:ln>
+        </p:spPr>
+        <p:style>
+          <a:lnRef idx="1">
+            <a:schemeClr val="accent1"/>
+          </a:lnRef>
+          <a:fillRef idx="0">
+            <a:schemeClr val="accent1"/>
+          </a:fillRef>
+          <a:effectRef idx="0">
+            <a:schemeClr val="accent1"/>
+          </a:effectRef>
+          <a:fontRef idx="minor">
+            <a:schemeClr val="tx1"/>
+          </a:fontRef>
+        </p:style>
+      </p:cxnSp>
+      <p:sp>
+        <p:nvSpPr>
+          <p:cNvPr id="52" name="51 CuadroTexto"/>
+          <p:cNvSpPr txBox="1"/>
+          <p:nvPr/>
+        </p:nvSpPr>
+        <p:spPr>
+          <a:xfrm>
+            <a:off x="6492627" y="4926335"/>
+            <a:ext cx="566181" cy="246221"/>
+          </a:xfrm>
+          <a:prstGeom prst="rect">
+            <a:avLst/>
+          </a:prstGeom>
+          <a:noFill/>
+        </p:spPr>
+        <p:txBody>
+          <a:bodyPr wrap="none" rtlCol="0">
+            <a:spAutoFit/>
+          </a:bodyPr>
+          <a:lstStyle/>
+          <a:p>
+            <a:r>
+              <a:rPr lang="en-GB" sz="1000" dirty="0" smtClean="0"/>
+              <a:t>Route J</a:t>
+            </a:r>
+            <a:endParaRPr lang="en-GB" sz="1000" dirty="0"/>
+          </a:p>
+        </p:txBody>
+      </p:sp>
+      <p:sp>
+        <p:nvSpPr>
+          <p:cNvPr id="53" name="52 CuadroTexto"/>
+          <p:cNvSpPr txBox="1"/>
+          <p:nvPr/>
+        </p:nvSpPr>
+        <p:spPr>
+          <a:xfrm>
+            <a:off x="6477422" y="5744369"/>
+            <a:ext cx="591829" cy="246221"/>
+          </a:xfrm>
+          <a:prstGeom prst="rect">
+            <a:avLst/>
+          </a:prstGeom>
+          <a:noFill/>
+        </p:spPr>
+        <p:txBody>
+          <a:bodyPr wrap="none" rtlCol="0">
+            <a:spAutoFit/>
+          </a:bodyPr>
+          <a:lstStyle/>
+          <a:p>
+            <a:r>
+              <a:rPr lang="en-GB" sz="1000" dirty="0" smtClean="0"/>
+              <a:t>Route K</a:t>
+            </a:r>
+            <a:endParaRPr lang="en-GB" sz="1000" dirty="0"/>
+          </a:p>
+        </p:txBody>
+      </p:sp>
+      <p:sp>
+        <p:nvSpPr>
+          <p:cNvPr id="55" name="54 Proceso predefinido"/>
+          <p:cNvSpPr/>
+          <p:nvPr/>
+        </p:nvSpPr>
+        <p:spPr>
+          <a:xfrm>
+            <a:off x="251520" y="332656"/>
+            <a:ext cx="648072" cy="288032"/>
+          </a:xfrm>
+          <a:prstGeom prst="flowChartPredefinedProcess">
+            <a:avLst/>
+          </a:prstGeom>
+        </p:spPr>
+        <p:style>
+          <a:lnRef idx="1">
+            <a:schemeClr val="accent1"/>
+          </a:lnRef>
+          <a:fillRef idx="2">
+            <a:schemeClr val="accent1"/>
+          </a:fillRef>
+          <a:effectRef idx="1">
+            <a:schemeClr val="accent1"/>
+          </a:effectRef>
+          <a:fontRef idx="minor">
+            <a:schemeClr val="dk1"/>
+          </a:fontRef>
+        </p:style>
+        <p:txBody>
+          <a:bodyPr rtlCol="0" anchor="ctr"/>
+          <a:lstStyle/>
+          <a:p>
+            <a:pPr algn="ctr"/>
+            <a:endParaRPr lang="en-GB"/>
+          </a:p>
+        </p:txBody>
+      </p:sp>
+      <p:sp>
+        <p:nvSpPr>
+          <p:cNvPr id="56" name="55 Preparación"/>
+          <p:cNvSpPr/>
+          <p:nvPr/>
+        </p:nvSpPr>
+        <p:spPr>
+          <a:xfrm>
+            <a:off x="251520" y="764704"/>
+            <a:ext cx="648072" cy="288032"/>
+          </a:xfrm>
+          <a:prstGeom prst="flowChartPreparation">
+            <a:avLst/>
+          </a:prstGeom>
+        </p:spPr>
+        <p:style>
+          <a:lnRef idx="1">
+            <a:schemeClr val="accent4"/>
+          </a:lnRef>
+          <a:fillRef idx="2">
+            <a:schemeClr val="accent4"/>
+          </a:fillRef>
+          <a:effectRef idx="1">
+            <a:schemeClr val="accent4"/>
+          </a:effectRef>
+          <a:fontRef idx="minor">
+            <a:schemeClr val="dk1"/>
+          </a:fontRef>
+        </p:style>
+        <p:txBody>
+          <a:bodyPr rtlCol="0" anchor="ctr"/>
+          <a:lstStyle/>
+          <a:p>
+            <a:pPr algn="ctr"/>
+            <a:endParaRPr lang="en-GB"/>
+          </a:p>
+        </p:txBody>
+      </p:sp>
+      <p:sp>
+        <p:nvSpPr>
+          <p:cNvPr id="57" name="56 CuadroTexto"/>
+          <p:cNvSpPr txBox="1"/>
+          <p:nvPr/>
+        </p:nvSpPr>
+        <p:spPr>
+          <a:xfrm>
+            <a:off x="971600" y="332656"/>
+            <a:ext cx="1271567" cy="276999"/>
+          </a:xfrm>
+          <a:prstGeom prst="rect">
+            <a:avLst/>
+          </a:prstGeom>
+          <a:noFill/>
+        </p:spPr>
+        <p:txBody>
+          <a:bodyPr wrap="none" rtlCol="0">
+            <a:spAutoFit/>
+          </a:bodyPr>
+          <a:lstStyle/>
+          <a:p>
+            <a:r>
+              <a:rPr lang="en-GB" sz="1200" dirty="0" smtClean="0"/>
+              <a:t>Destination block</a:t>
+            </a:r>
+            <a:endParaRPr lang="en-GB" sz="1200" dirty="0"/>
+          </a:p>
+        </p:txBody>
+      </p:sp>
+      <p:sp>
+        <p:nvSpPr>
+          <p:cNvPr id="58" name="57 CuadroTexto"/>
+          <p:cNvSpPr txBox="1"/>
+          <p:nvPr/>
+        </p:nvSpPr>
+        <p:spPr>
+          <a:xfrm>
+            <a:off x="971600" y="775737"/>
+            <a:ext cx="934230" cy="276999"/>
+          </a:xfrm>
+          <a:prstGeom prst="rect">
+            <a:avLst/>
+          </a:prstGeom>
+          <a:noFill/>
+        </p:spPr>
+        <p:txBody>
+          <a:bodyPr wrap="none" rtlCol="0">
+            <a:spAutoFit/>
+          </a:bodyPr>
+          <a:lstStyle/>
+          <a:p>
+            <a:r>
+              <a:rPr lang="en-GB" sz="1200" dirty="0" smtClean="0"/>
+              <a:t>Traffic block</a:t>
+            </a:r>
+            <a:endParaRPr lang="en-GB" sz="1200" dirty="0"/>
+          </a:p>
+        </p:txBody>
+      </p:sp>
+      <p:sp>
+        <p:nvSpPr>
+          <p:cNvPr id="60" name="59 CuadroTexto"/>
+          <p:cNvSpPr txBox="1"/>
+          <p:nvPr/>
+        </p:nvSpPr>
+        <p:spPr>
+          <a:xfrm>
+            <a:off x="4355976" y="4221088"/>
+            <a:ext cx="591829" cy="246221"/>
+          </a:xfrm>
+          <a:prstGeom prst="rect">
+            <a:avLst/>
+          </a:prstGeom>
+          <a:noFill/>
+        </p:spPr>
+        <p:txBody>
+          <a:bodyPr wrap="none" rtlCol="0">
+            <a:spAutoFit/>
+          </a:bodyPr>
+          <a:lstStyle/>
+          <a:p>
+            <a:r>
+              <a:rPr lang="en-GB" sz="1000" dirty="0" smtClean="0"/>
+              <a:t>Route L</a:t>
+            </a:r>
+            <a:endParaRPr lang="en-GB" sz="1000" dirty="0"/>
           </a:p>
         </p:txBody>
       </p:sp>

</xml_diff>